<commit_message>
pre-processamento completo (sampling e verificação da distribuição)
</commit_message>
<xml_diff>
--- a/Criminality in Chicago_FOR_TOMORROW.pptx
+++ b/Criminality in Chicago_FOR_TOMORROW.pptx
@@ -4,15 +4,19 @@
   <p:sldMasterIdLst>
     <p:sldMasterId id="2147483680" r:id="rId1"/>
   </p:sldMasterIdLst>
+  <p:notesMasterIdLst>
+    <p:notesMasterId r:id="rId11"/>
+  </p:notesMasterIdLst>
   <p:sldIdLst>
     <p:sldId id="257" r:id="rId2"/>
     <p:sldId id="263" r:id="rId3"/>
     <p:sldId id="266" r:id="rId4"/>
     <p:sldId id="265" r:id="rId5"/>
-    <p:sldId id="269" r:id="rId6"/>
-    <p:sldId id="267" r:id="rId7"/>
-    <p:sldId id="270" r:id="rId8"/>
-    <p:sldId id="268" r:id="rId9"/>
+    <p:sldId id="271" r:id="rId6"/>
+    <p:sldId id="269" r:id="rId7"/>
+    <p:sldId id="267" r:id="rId8"/>
+    <p:sldId id="270" r:id="rId9"/>
+    <p:sldId id="268" r:id="rId10"/>
   </p:sldIdLst>
   <p:sldSz cx="12192000" cy="6858000"/>
   <p:notesSz cx="6858000" cy="9144000"/>
@@ -119,6 +123,1909 @@
 </p:presentation>
 </file>
 
+<file path=ppt/notesMasters/notesMaster1.xml><?xml version="1.0" encoding="utf-8"?>
+<p:notesMaster xmlns:a="http://schemas.openxmlformats.org/drawingml/2006/main" xmlns:r="http://schemas.openxmlformats.org/officeDocument/2006/relationships" xmlns:p="http://schemas.openxmlformats.org/presentationml/2006/main">
+  <p:cSld>
+    <p:bg>
+      <p:bgRef idx="1001">
+        <a:schemeClr val="bg1"/>
+      </p:bgRef>
+    </p:bg>
+    <p:spTree>
+      <p:nvGrpSpPr>
+        <p:cNvPr id="1" name=""/>
+        <p:cNvGrpSpPr/>
+        <p:nvPr/>
+      </p:nvGrpSpPr>
+      <p:grpSpPr>
+        <a:xfrm>
+          <a:off x="0" y="0"/>
+          <a:ext cx="0" cy="0"/>
+          <a:chOff x="0" y="0"/>
+          <a:chExt cx="0" cy="0"/>
+        </a:xfrm>
+      </p:grpSpPr>
+      <p:sp>
+        <p:nvSpPr>
+          <p:cNvPr id="2" name="Marcador de Posição do Cabeçalho 1"/>
+          <p:cNvSpPr>
+            <a:spLocks noGrp="1"/>
+          </p:cNvSpPr>
+          <p:nvPr>
+            <p:ph type="hdr" sz="quarter"/>
+          </p:nvPr>
+        </p:nvSpPr>
+        <p:spPr>
+          <a:xfrm>
+            <a:off x="0" y="0"/>
+            <a:ext cx="2971800" cy="458788"/>
+          </a:xfrm>
+          <a:prstGeom prst="rect">
+            <a:avLst/>
+          </a:prstGeom>
+        </p:spPr>
+        <p:txBody>
+          <a:bodyPr vert="horz" lIns="91440" tIns="45720" rIns="91440" bIns="45720" rtlCol="0"/>
+          <a:lstStyle>
+            <a:lvl1pPr algn="l">
+              <a:defRPr sz="1200"/>
+            </a:lvl1pPr>
+          </a:lstStyle>
+          <a:p>
+            <a:endParaRPr lang="pt-PT"/>
+          </a:p>
+        </p:txBody>
+      </p:sp>
+      <p:sp>
+        <p:nvSpPr>
+          <p:cNvPr id="3" name="Marcador de Posição da Data 2"/>
+          <p:cNvSpPr>
+            <a:spLocks noGrp="1"/>
+          </p:cNvSpPr>
+          <p:nvPr>
+            <p:ph type="dt" idx="1"/>
+          </p:nvPr>
+        </p:nvSpPr>
+        <p:spPr>
+          <a:xfrm>
+            <a:off x="3884613" y="0"/>
+            <a:ext cx="2971800" cy="458788"/>
+          </a:xfrm>
+          <a:prstGeom prst="rect">
+            <a:avLst/>
+          </a:prstGeom>
+        </p:spPr>
+        <p:txBody>
+          <a:bodyPr vert="horz" lIns="91440" tIns="45720" rIns="91440" bIns="45720" rtlCol="0"/>
+          <a:lstStyle>
+            <a:lvl1pPr algn="r">
+              <a:defRPr sz="1200"/>
+            </a:lvl1pPr>
+          </a:lstStyle>
+          <a:p>
+            <a:fld id="{F31F9B29-5519-48AF-86A8-1E83E5B295EB}" type="datetimeFigureOut">
+              <a:rPr lang="pt-PT" smtClean="0"/>
+              <a:t>07/11/2019</a:t>
+            </a:fld>
+            <a:endParaRPr lang="pt-PT"/>
+          </a:p>
+        </p:txBody>
+      </p:sp>
+      <p:sp>
+        <p:nvSpPr>
+          <p:cNvPr id="4" name="Marcador de Posição da Imagem do Diapositivo 3"/>
+          <p:cNvSpPr>
+            <a:spLocks noGrp="1" noRot="1" noChangeAspect="1"/>
+          </p:cNvSpPr>
+          <p:nvPr>
+            <p:ph type="sldImg" idx="2"/>
+          </p:nvPr>
+        </p:nvSpPr>
+        <p:spPr>
+          <a:xfrm>
+            <a:off x="685800" y="1143000"/>
+            <a:ext cx="5486400" cy="3086100"/>
+          </a:xfrm>
+          <a:prstGeom prst="rect">
+            <a:avLst/>
+          </a:prstGeom>
+          <a:noFill/>
+          <a:ln w="12700">
+            <a:solidFill>
+              <a:prstClr val="black"/>
+            </a:solidFill>
+          </a:ln>
+        </p:spPr>
+        <p:txBody>
+          <a:bodyPr vert="horz" lIns="91440" tIns="45720" rIns="91440" bIns="45720" rtlCol="0" anchor="ctr"/>
+          <a:lstStyle/>
+          <a:p>
+            <a:endParaRPr lang="pt-PT"/>
+          </a:p>
+        </p:txBody>
+      </p:sp>
+      <p:sp>
+        <p:nvSpPr>
+          <p:cNvPr id="5" name="Marcador de Posição de Notas 4"/>
+          <p:cNvSpPr>
+            <a:spLocks noGrp="1"/>
+          </p:cNvSpPr>
+          <p:nvPr>
+            <p:ph type="body" sz="quarter" idx="3"/>
+          </p:nvPr>
+        </p:nvSpPr>
+        <p:spPr>
+          <a:xfrm>
+            <a:off x="685800" y="4400550"/>
+            <a:ext cx="5486400" cy="3600450"/>
+          </a:xfrm>
+          <a:prstGeom prst="rect">
+            <a:avLst/>
+          </a:prstGeom>
+        </p:spPr>
+        <p:txBody>
+          <a:bodyPr vert="horz" lIns="91440" tIns="45720" rIns="91440" bIns="45720" rtlCol="0"/>
+          <a:lstStyle/>
+          <a:p>
+            <a:pPr lvl="0"/>
+            <a:r>
+              <a:rPr lang="pt-PT"/>
+              <a:t>Clique para editar os estilos do texto de Modelo Global</a:t>
+            </a:r>
+          </a:p>
+          <a:p>
+            <a:pPr lvl="1"/>
+            <a:r>
+              <a:rPr lang="pt-PT"/>
+              <a:t>Segundo nível</a:t>
+            </a:r>
+          </a:p>
+          <a:p>
+            <a:pPr lvl="2"/>
+            <a:r>
+              <a:rPr lang="pt-PT"/>
+              <a:t>Terceiro nível</a:t>
+            </a:r>
+          </a:p>
+          <a:p>
+            <a:pPr lvl="3"/>
+            <a:r>
+              <a:rPr lang="pt-PT"/>
+              <a:t>Quarto nível</a:t>
+            </a:r>
+          </a:p>
+          <a:p>
+            <a:pPr lvl="4"/>
+            <a:r>
+              <a:rPr lang="pt-PT"/>
+              <a:t>Quinto nível</a:t>
+            </a:r>
+          </a:p>
+        </p:txBody>
+      </p:sp>
+      <p:sp>
+        <p:nvSpPr>
+          <p:cNvPr id="6" name="Marcador de Posição do Rodapé 5"/>
+          <p:cNvSpPr>
+            <a:spLocks noGrp="1"/>
+          </p:cNvSpPr>
+          <p:nvPr>
+            <p:ph type="ftr" sz="quarter" idx="4"/>
+          </p:nvPr>
+        </p:nvSpPr>
+        <p:spPr>
+          <a:xfrm>
+            <a:off x="0" y="8685213"/>
+            <a:ext cx="2971800" cy="458787"/>
+          </a:xfrm>
+          <a:prstGeom prst="rect">
+            <a:avLst/>
+          </a:prstGeom>
+        </p:spPr>
+        <p:txBody>
+          <a:bodyPr vert="horz" lIns="91440" tIns="45720" rIns="91440" bIns="45720" rtlCol="0" anchor="b"/>
+          <a:lstStyle>
+            <a:lvl1pPr algn="l">
+              <a:defRPr sz="1200"/>
+            </a:lvl1pPr>
+          </a:lstStyle>
+          <a:p>
+            <a:endParaRPr lang="pt-PT"/>
+          </a:p>
+        </p:txBody>
+      </p:sp>
+      <p:sp>
+        <p:nvSpPr>
+          <p:cNvPr id="7" name="Marcador de Posição do Número do Diapositivo 6"/>
+          <p:cNvSpPr>
+            <a:spLocks noGrp="1"/>
+          </p:cNvSpPr>
+          <p:nvPr>
+            <p:ph type="sldNum" sz="quarter" idx="5"/>
+          </p:nvPr>
+        </p:nvSpPr>
+        <p:spPr>
+          <a:xfrm>
+            <a:off x="3884613" y="8685213"/>
+            <a:ext cx="2971800" cy="458787"/>
+          </a:xfrm>
+          <a:prstGeom prst="rect">
+            <a:avLst/>
+          </a:prstGeom>
+        </p:spPr>
+        <p:txBody>
+          <a:bodyPr vert="horz" lIns="91440" tIns="45720" rIns="91440" bIns="45720" rtlCol="0" anchor="b"/>
+          <a:lstStyle>
+            <a:lvl1pPr algn="r">
+              <a:defRPr sz="1200"/>
+            </a:lvl1pPr>
+          </a:lstStyle>
+          <a:p>
+            <a:fld id="{BDBD5865-30E7-487F-A6A0-BDA0A6CF9924}" type="slidenum">
+              <a:rPr lang="pt-PT" smtClean="0"/>
+              <a:t>‹nº›</a:t>
+            </a:fld>
+            <a:endParaRPr lang="pt-PT"/>
+          </a:p>
+        </p:txBody>
+      </p:sp>
+    </p:spTree>
+    <p:extLst>
+      <p:ext uri="{BB962C8B-B14F-4D97-AF65-F5344CB8AC3E}">
+        <p14:creationId xmlns:p14="http://schemas.microsoft.com/office/powerpoint/2010/main" val="388718844"/>
+      </p:ext>
+    </p:extLst>
+  </p:cSld>
+  <p:clrMap bg1="lt1" tx1="dk1" bg2="lt2" tx2="dk2" accent1="accent1" accent2="accent2" accent3="accent3" accent4="accent4" accent5="accent5" accent6="accent6" hlink="hlink" folHlink="folHlink"/>
+  <p:notesStyle>
+    <a:lvl1pPr marL="0" algn="l" defTabSz="914400" rtl="0" eaLnBrk="1" latinLnBrk="0" hangingPunct="1">
+      <a:defRPr sz="1200" kern="1200">
+        <a:solidFill>
+          <a:schemeClr val="tx1"/>
+        </a:solidFill>
+        <a:latin typeface="+mn-lt"/>
+        <a:ea typeface="+mn-ea"/>
+        <a:cs typeface="+mn-cs"/>
+      </a:defRPr>
+    </a:lvl1pPr>
+    <a:lvl2pPr marL="457200" algn="l" defTabSz="914400" rtl="0" eaLnBrk="1" latinLnBrk="0" hangingPunct="1">
+      <a:defRPr sz="1200" kern="1200">
+        <a:solidFill>
+          <a:schemeClr val="tx1"/>
+        </a:solidFill>
+        <a:latin typeface="+mn-lt"/>
+        <a:ea typeface="+mn-ea"/>
+        <a:cs typeface="+mn-cs"/>
+      </a:defRPr>
+    </a:lvl2pPr>
+    <a:lvl3pPr marL="914400" algn="l" defTabSz="914400" rtl="0" eaLnBrk="1" latinLnBrk="0" hangingPunct="1">
+      <a:defRPr sz="1200" kern="1200">
+        <a:solidFill>
+          <a:schemeClr val="tx1"/>
+        </a:solidFill>
+        <a:latin typeface="+mn-lt"/>
+        <a:ea typeface="+mn-ea"/>
+        <a:cs typeface="+mn-cs"/>
+      </a:defRPr>
+    </a:lvl3pPr>
+    <a:lvl4pPr marL="1371600" algn="l" defTabSz="914400" rtl="0" eaLnBrk="1" latinLnBrk="0" hangingPunct="1">
+      <a:defRPr sz="1200" kern="1200">
+        <a:solidFill>
+          <a:schemeClr val="tx1"/>
+        </a:solidFill>
+        <a:latin typeface="+mn-lt"/>
+        <a:ea typeface="+mn-ea"/>
+        <a:cs typeface="+mn-cs"/>
+      </a:defRPr>
+    </a:lvl4pPr>
+    <a:lvl5pPr marL="1828800" algn="l" defTabSz="914400" rtl="0" eaLnBrk="1" latinLnBrk="0" hangingPunct="1">
+      <a:defRPr sz="1200" kern="1200">
+        <a:solidFill>
+          <a:schemeClr val="tx1"/>
+        </a:solidFill>
+        <a:latin typeface="+mn-lt"/>
+        <a:ea typeface="+mn-ea"/>
+        <a:cs typeface="+mn-cs"/>
+      </a:defRPr>
+    </a:lvl5pPr>
+    <a:lvl6pPr marL="2286000" algn="l" defTabSz="914400" rtl="0" eaLnBrk="1" latinLnBrk="0" hangingPunct="1">
+      <a:defRPr sz="1200" kern="1200">
+        <a:solidFill>
+          <a:schemeClr val="tx1"/>
+        </a:solidFill>
+        <a:latin typeface="+mn-lt"/>
+        <a:ea typeface="+mn-ea"/>
+        <a:cs typeface="+mn-cs"/>
+      </a:defRPr>
+    </a:lvl6pPr>
+    <a:lvl7pPr marL="2743200" algn="l" defTabSz="914400" rtl="0" eaLnBrk="1" latinLnBrk="0" hangingPunct="1">
+      <a:defRPr sz="1200" kern="1200">
+        <a:solidFill>
+          <a:schemeClr val="tx1"/>
+        </a:solidFill>
+        <a:latin typeface="+mn-lt"/>
+        <a:ea typeface="+mn-ea"/>
+        <a:cs typeface="+mn-cs"/>
+      </a:defRPr>
+    </a:lvl7pPr>
+    <a:lvl8pPr marL="3200400" algn="l" defTabSz="914400" rtl="0" eaLnBrk="1" latinLnBrk="0" hangingPunct="1">
+      <a:defRPr sz="1200" kern="1200">
+        <a:solidFill>
+          <a:schemeClr val="tx1"/>
+        </a:solidFill>
+        <a:latin typeface="+mn-lt"/>
+        <a:ea typeface="+mn-ea"/>
+        <a:cs typeface="+mn-cs"/>
+      </a:defRPr>
+    </a:lvl8pPr>
+    <a:lvl9pPr marL="3657600" algn="l" defTabSz="914400" rtl="0" eaLnBrk="1" latinLnBrk="0" hangingPunct="1">
+      <a:defRPr sz="1200" kern="1200">
+        <a:solidFill>
+          <a:schemeClr val="tx1"/>
+        </a:solidFill>
+        <a:latin typeface="+mn-lt"/>
+        <a:ea typeface="+mn-ea"/>
+        <a:cs typeface="+mn-cs"/>
+      </a:defRPr>
+    </a:lvl9pPr>
+  </p:notesStyle>
+</p:notesMaster>
+</file>
+
+<file path=ppt/notesSlides/notesSlide1.xml><?xml version="1.0" encoding="utf-8"?>
+<p:notes xmlns:a="http://schemas.openxmlformats.org/drawingml/2006/main" xmlns:r="http://schemas.openxmlformats.org/officeDocument/2006/relationships" xmlns:p="http://schemas.openxmlformats.org/presentationml/2006/main">
+  <p:cSld>
+    <p:spTree>
+      <p:nvGrpSpPr>
+        <p:cNvPr id="1" name=""/>
+        <p:cNvGrpSpPr/>
+        <p:nvPr/>
+      </p:nvGrpSpPr>
+      <p:grpSpPr>
+        <a:xfrm>
+          <a:off x="0" y="0"/>
+          <a:ext cx="0" cy="0"/>
+          <a:chOff x="0" y="0"/>
+          <a:chExt cx="0" cy="0"/>
+        </a:xfrm>
+      </p:grpSpPr>
+      <p:sp>
+        <p:nvSpPr>
+          <p:cNvPr id="2" name="Marcador de Posição da Imagem do Diapositivo 1"/>
+          <p:cNvSpPr>
+            <a:spLocks noGrp="1" noRot="1" noChangeAspect="1"/>
+          </p:cNvSpPr>
+          <p:nvPr>
+            <p:ph type="sldImg"/>
+          </p:nvPr>
+        </p:nvSpPr>
+        <p:spPr/>
+      </p:sp>
+      <p:sp>
+        <p:nvSpPr>
+          <p:cNvPr id="3" name="Marcador de Posição de Notas 2"/>
+          <p:cNvSpPr>
+            <a:spLocks noGrp="1"/>
+          </p:cNvSpPr>
+          <p:nvPr>
+            <p:ph type="body" idx="1"/>
+          </p:nvPr>
+        </p:nvSpPr>
+        <p:spPr/>
+        <p:txBody>
+          <a:bodyPr/>
+          <a:lstStyle/>
+          <a:p>
+            <a:r>
+              <a:rPr lang="pt-PT" dirty="0"/>
+              <a:t>22 </a:t>
+            </a:r>
+            <a:r>
+              <a:rPr lang="pt-PT" dirty="0" err="1"/>
+              <a:t>features</a:t>
+            </a:r>
+            <a:r>
+              <a:rPr lang="pt-PT" dirty="0"/>
+              <a:t>, </a:t>
+            </a:r>
+            <a:r>
+              <a:rPr lang="pt-PT" dirty="0" err="1"/>
+              <a:t>from</a:t>
+            </a:r>
+            <a:r>
+              <a:rPr lang="pt-PT" dirty="0"/>
+              <a:t> date to </a:t>
+            </a:r>
+            <a:r>
+              <a:rPr lang="pt-PT" dirty="0" err="1"/>
+              <a:t>type</a:t>
+            </a:r>
+            <a:r>
+              <a:rPr lang="pt-PT" dirty="0"/>
+              <a:t> </a:t>
+            </a:r>
+            <a:r>
+              <a:rPr lang="pt-PT" dirty="0" err="1"/>
+              <a:t>of</a:t>
+            </a:r>
+            <a:r>
+              <a:rPr lang="pt-PT" dirty="0"/>
+              <a:t> crime </a:t>
+            </a:r>
+            <a:r>
+              <a:rPr lang="pt-PT" dirty="0" err="1"/>
+              <a:t>and</a:t>
+            </a:r>
+            <a:r>
+              <a:rPr lang="pt-PT" dirty="0"/>
+              <a:t> </a:t>
+            </a:r>
+            <a:r>
+              <a:rPr lang="pt-PT" dirty="0" err="1"/>
+              <a:t>geographic</a:t>
+            </a:r>
+            <a:r>
+              <a:rPr lang="pt-PT" dirty="0"/>
+              <a:t> </a:t>
+            </a:r>
+            <a:r>
+              <a:rPr lang="pt-PT" dirty="0" err="1"/>
+              <a:t>location</a:t>
+            </a:r>
+            <a:r>
+              <a:rPr lang="pt-PT" dirty="0"/>
+              <a:t>, </a:t>
+            </a:r>
+            <a:r>
+              <a:rPr lang="pt-PT" dirty="0" err="1"/>
+              <a:t>that</a:t>
+            </a:r>
+            <a:r>
+              <a:rPr lang="pt-PT" dirty="0"/>
+              <a:t> </a:t>
+            </a:r>
+            <a:r>
+              <a:rPr lang="pt-PT" dirty="0" err="1"/>
+              <a:t>include</a:t>
+            </a:r>
+            <a:r>
+              <a:rPr lang="pt-PT" dirty="0"/>
+              <a:t> </a:t>
+            </a:r>
+            <a:r>
+              <a:rPr lang="pt-PT" dirty="0" err="1"/>
+              <a:t>all</a:t>
+            </a:r>
+            <a:r>
+              <a:rPr lang="pt-PT" dirty="0"/>
+              <a:t> </a:t>
+            </a:r>
+            <a:r>
+              <a:rPr lang="pt-PT" dirty="0" err="1"/>
+              <a:t>types</a:t>
+            </a:r>
+            <a:r>
+              <a:rPr lang="pt-PT" dirty="0"/>
+              <a:t> </a:t>
+            </a:r>
+            <a:r>
+              <a:rPr lang="pt-PT" dirty="0" err="1"/>
+              <a:t>of</a:t>
+            </a:r>
+            <a:r>
+              <a:rPr lang="pt-PT" dirty="0"/>
+              <a:t> </a:t>
+            </a:r>
+            <a:r>
+              <a:rPr lang="pt-PT" dirty="0" err="1"/>
+              <a:t>values</a:t>
+            </a:r>
+            <a:r>
+              <a:rPr lang="pt-PT" dirty="0"/>
+              <a:t> (logical, </a:t>
+            </a:r>
+            <a:r>
+              <a:rPr lang="pt-PT" dirty="0" err="1"/>
+              <a:t>numerical</a:t>
+            </a:r>
+            <a:r>
+              <a:rPr lang="pt-PT" dirty="0"/>
+              <a:t>, factos, etc.).</a:t>
+            </a:r>
+          </a:p>
+          <a:p>
+            <a:r>
+              <a:rPr lang="pt-PT" dirty="0" err="1"/>
+              <a:t>When</a:t>
+            </a:r>
+            <a:r>
+              <a:rPr lang="pt-PT" dirty="0"/>
+              <a:t> </a:t>
+            </a:r>
+            <a:r>
+              <a:rPr lang="pt-PT" dirty="0" err="1"/>
+              <a:t>exploring</a:t>
+            </a:r>
+            <a:r>
+              <a:rPr lang="pt-PT" dirty="0"/>
+              <a:t> </a:t>
+            </a:r>
+            <a:r>
+              <a:rPr lang="pt-PT" dirty="0" err="1"/>
+              <a:t>the</a:t>
+            </a:r>
+            <a:r>
+              <a:rPr lang="pt-PT" dirty="0"/>
+              <a:t> </a:t>
+            </a:r>
+            <a:r>
+              <a:rPr lang="pt-PT" dirty="0" err="1"/>
+              <a:t>dataset</a:t>
+            </a:r>
+            <a:r>
+              <a:rPr lang="pt-PT" dirty="0"/>
+              <a:t> </a:t>
+            </a:r>
+            <a:r>
+              <a:rPr lang="pt-PT" dirty="0" err="1"/>
+              <a:t>we</a:t>
+            </a:r>
+            <a:r>
+              <a:rPr lang="pt-PT" dirty="0"/>
+              <a:t> </a:t>
+            </a:r>
+            <a:r>
+              <a:rPr lang="pt-PT" dirty="0" err="1"/>
+              <a:t>found</a:t>
+            </a:r>
+            <a:r>
+              <a:rPr lang="pt-PT" dirty="0"/>
+              <a:t> some </a:t>
+            </a:r>
+            <a:r>
+              <a:rPr lang="pt-PT" dirty="0" err="1"/>
+              <a:t>columns</a:t>
+            </a:r>
+            <a:r>
+              <a:rPr lang="pt-PT" dirty="0"/>
+              <a:t> </a:t>
+            </a:r>
+            <a:r>
+              <a:rPr lang="pt-PT" dirty="0" err="1"/>
+              <a:t>with</a:t>
+            </a:r>
+            <a:r>
+              <a:rPr lang="pt-PT" dirty="0"/>
+              <a:t> </a:t>
+            </a:r>
+            <a:r>
+              <a:rPr lang="pt-PT" dirty="0" err="1"/>
+              <a:t>missing</a:t>
+            </a:r>
+            <a:r>
+              <a:rPr lang="pt-PT" dirty="0"/>
+              <a:t> </a:t>
+            </a:r>
+            <a:r>
+              <a:rPr lang="pt-PT" dirty="0" err="1"/>
+              <a:t>values</a:t>
+            </a:r>
+            <a:r>
+              <a:rPr lang="pt-PT" dirty="0"/>
+              <a:t> </a:t>
+            </a:r>
+            <a:r>
+              <a:rPr lang="pt-PT" dirty="0" err="1"/>
+              <a:t>that</a:t>
+            </a:r>
+            <a:r>
+              <a:rPr lang="pt-PT" dirty="0"/>
+              <a:t> </a:t>
+            </a:r>
+            <a:r>
+              <a:rPr lang="pt-PT" dirty="0" err="1"/>
+              <a:t>can’t</a:t>
+            </a:r>
+            <a:r>
+              <a:rPr lang="pt-PT" dirty="0"/>
+              <a:t> </a:t>
+            </a:r>
+            <a:r>
+              <a:rPr lang="pt-PT" dirty="0" err="1"/>
+              <a:t>be</a:t>
+            </a:r>
+            <a:r>
+              <a:rPr lang="pt-PT" dirty="0"/>
+              <a:t> </a:t>
+            </a:r>
+            <a:r>
+              <a:rPr lang="pt-PT" dirty="0" err="1"/>
+              <a:t>used</a:t>
+            </a:r>
+            <a:r>
+              <a:rPr lang="pt-PT" dirty="0"/>
+              <a:t>, </a:t>
+            </a:r>
+            <a:r>
+              <a:rPr lang="pt-PT" dirty="0" err="1"/>
+              <a:t>like</a:t>
+            </a:r>
+            <a:r>
+              <a:rPr lang="pt-PT" dirty="0"/>
+              <a:t> </a:t>
+            </a:r>
+            <a:r>
+              <a:rPr lang="pt-PT" dirty="0" err="1"/>
+              <a:t>the</a:t>
+            </a:r>
+            <a:r>
+              <a:rPr lang="pt-PT" dirty="0"/>
+              <a:t> </a:t>
+            </a:r>
+            <a:r>
+              <a:rPr lang="pt-PT" dirty="0" err="1"/>
+              <a:t>ward</a:t>
+            </a:r>
+            <a:r>
+              <a:rPr lang="pt-PT" dirty="0"/>
+              <a:t>, </a:t>
+            </a:r>
+            <a:r>
+              <a:rPr lang="pt-PT" dirty="0" err="1"/>
+              <a:t>community</a:t>
+            </a:r>
+            <a:r>
+              <a:rPr lang="pt-PT" dirty="0"/>
+              <a:t> área, </a:t>
+            </a:r>
+            <a:r>
+              <a:rPr lang="pt-PT" dirty="0" err="1"/>
+              <a:t>and</a:t>
+            </a:r>
+            <a:r>
+              <a:rPr lang="pt-PT" dirty="0"/>
+              <a:t> </a:t>
+            </a:r>
+            <a:r>
+              <a:rPr lang="pt-PT" dirty="0" err="1"/>
+              <a:t>the</a:t>
+            </a:r>
+            <a:r>
+              <a:rPr lang="pt-PT" dirty="0"/>
+              <a:t> </a:t>
+            </a:r>
+            <a:r>
+              <a:rPr lang="pt-PT" dirty="0" err="1"/>
+              <a:t>columns</a:t>
+            </a:r>
+            <a:r>
+              <a:rPr lang="pt-PT" dirty="0"/>
+              <a:t> </a:t>
+            </a:r>
+            <a:r>
+              <a:rPr lang="pt-PT" dirty="0" err="1"/>
+              <a:t>related</a:t>
+            </a:r>
+            <a:r>
+              <a:rPr lang="pt-PT" dirty="0"/>
+              <a:t> to </a:t>
+            </a:r>
+            <a:r>
+              <a:rPr lang="pt-PT" dirty="0" err="1"/>
+              <a:t>the</a:t>
+            </a:r>
+            <a:r>
+              <a:rPr lang="pt-PT" dirty="0"/>
+              <a:t> </a:t>
+            </a:r>
+            <a:r>
+              <a:rPr lang="pt-PT" dirty="0" err="1"/>
+              <a:t>geographic</a:t>
+            </a:r>
+            <a:r>
+              <a:rPr lang="pt-PT" dirty="0"/>
+              <a:t> </a:t>
+            </a:r>
+            <a:r>
+              <a:rPr lang="pt-PT" dirty="0" err="1"/>
+              <a:t>location</a:t>
+            </a:r>
+            <a:r>
+              <a:rPr lang="pt-PT" dirty="0"/>
+              <a:t>.</a:t>
+            </a:r>
+          </a:p>
+        </p:txBody>
+      </p:sp>
+      <p:sp>
+        <p:nvSpPr>
+          <p:cNvPr id="4" name="Marcador de Posição do Número do Diapositivo 3"/>
+          <p:cNvSpPr>
+            <a:spLocks noGrp="1"/>
+          </p:cNvSpPr>
+          <p:nvPr>
+            <p:ph type="sldNum" sz="quarter" idx="5"/>
+          </p:nvPr>
+        </p:nvSpPr>
+        <p:spPr/>
+        <p:txBody>
+          <a:bodyPr/>
+          <a:lstStyle/>
+          <a:p>
+            <a:fld id="{BDBD5865-30E7-487F-A6A0-BDA0A6CF9924}" type="slidenum">
+              <a:rPr lang="pt-PT" smtClean="0"/>
+              <a:t>2</a:t>
+            </a:fld>
+            <a:endParaRPr lang="pt-PT"/>
+          </a:p>
+        </p:txBody>
+      </p:sp>
+    </p:spTree>
+    <p:extLst>
+      <p:ext uri="{BB962C8B-B14F-4D97-AF65-F5344CB8AC3E}">
+        <p14:creationId xmlns:p14="http://schemas.microsoft.com/office/powerpoint/2010/main" val="4002728834"/>
+      </p:ext>
+    </p:extLst>
+  </p:cSld>
+  <p:clrMapOvr>
+    <a:masterClrMapping/>
+  </p:clrMapOvr>
+</p:notes>
+</file>
+
+<file path=ppt/notesSlides/notesSlide2.xml><?xml version="1.0" encoding="utf-8"?>
+<p:notes xmlns:a="http://schemas.openxmlformats.org/drawingml/2006/main" xmlns:r="http://schemas.openxmlformats.org/officeDocument/2006/relationships" xmlns:p="http://schemas.openxmlformats.org/presentationml/2006/main">
+  <p:cSld>
+    <p:spTree>
+      <p:nvGrpSpPr>
+        <p:cNvPr id="1" name=""/>
+        <p:cNvGrpSpPr/>
+        <p:nvPr/>
+      </p:nvGrpSpPr>
+      <p:grpSpPr>
+        <a:xfrm>
+          <a:off x="0" y="0"/>
+          <a:ext cx="0" cy="0"/>
+          <a:chOff x="0" y="0"/>
+          <a:chExt cx="0" cy="0"/>
+        </a:xfrm>
+      </p:grpSpPr>
+      <p:sp>
+        <p:nvSpPr>
+          <p:cNvPr id="2" name="Marcador de Posição da Imagem do Diapositivo 1"/>
+          <p:cNvSpPr>
+            <a:spLocks noGrp="1" noRot="1" noChangeAspect="1"/>
+          </p:cNvSpPr>
+          <p:nvPr>
+            <p:ph type="sldImg"/>
+          </p:nvPr>
+        </p:nvSpPr>
+        <p:spPr/>
+      </p:sp>
+      <p:sp>
+        <p:nvSpPr>
+          <p:cNvPr id="3" name="Marcador de Posição de Notas 2"/>
+          <p:cNvSpPr>
+            <a:spLocks noGrp="1"/>
+          </p:cNvSpPr>
+          <p:nvPr>
+            <p:ph type="body" idx="1"/>
+          </p:nvPr>
+        </p:nvSpPr>
+        <p:spPr/>
+        <p:txBody>
+          <a:bodyPr/>
+          <a:lstStyle/>
+          <a:p>
+            <a:r>
+              <a:rPr lang="pt-PT" dirty="0" err="1"/>
+              <a:t>We</a:t>
+            </a:r>
+            <a:r>
+              <a:rPr lang="pt-PT" dirty="0"/>
+              <a:t> </a:t>
+            </a:r>
+            <a:r>
+              <a:rPr lang="pt-PT" dirty="0" err="1"/>
+              <a:t>started</a:t>
+            </a:r>
+            <a:r>
+              <a:rPr lang="pt-PT" dirty="0"/>
+              <a:t> </a:t>
+            </a:r>
+            <a:r>
+              <a:rPr lang="pt-PT" dirty="0" err="1"/>
+              <a:t>by</a:t>
+            </a:r>
+            <a:r>
+              <a:rPr lang="pt-PT" dirty="0"/>
+              <a:t> </a:t>
+            </a:r>
+            <a:r>
+              <a:rPr lang="pt-PT" dirty="0" err="1"/>
+              <a:t>asking</a:t>
+            </a:r>
+            <a:r>
+              <a:rPr lang="pt-PT" dirty="0"/>
+              <a:t> some </a:t>
+            </a:r>
+            <a:r>
+              <a:rPr lang="pt-PT" dirty="0" err="1"/>
+              <a:t>questions</a:t>
+            </a:r>
+            <a:r>
+              <a:rPr lang="pt-PT" dirty="0"/>
+              <a:t> </a:t>
+            </a:r>
+            <a:r>
+              <a:rPr lang="pt-PT" dirty="0" err="1"/>
+              <a:t>that</a:t>
+            </a:r>
+            <a:r>
+              <a:rPr lang="pt-PT" dirty="0"/>
+              <a:t> </a:t>
+            </a:r>
+            <a:r>
+              <a:rPr lang="pt-PT" dirty="0" err="1"/>
+              <a:t>make</a:t>
+            </a:r>
+            <a:r>
+              <a:rPr lang="pt-PT" dirty="0"/>
+              <a:t> </a:t>
+            </a:r>
+            <a:r>
+              <a:rPr lang="pt-PT" dirty="0" err="1"/>
+              <a:t>the</a:t>
+            </a:r>
+            <a:r>
+              <a:rPr lang="pt-PT" dirty="0"/>
+              <a:t> </a:t>
+            </a:r>
+            <a:r>
+              <a:rPr lang="pt-PT" dirty="0" err="1"/>
+              <a:t>main</a:t>
+            </a:r>
+            <a:r>
+              <a:rPr lang="pt-PT" dirty="0"/>
+              <a:t> </a:t>
+            </a:r>
+            <a:r>
+              <a:rPr lang="pt-PT" dirty="0" err="1"/>
+              <a:t>problem</a:t>
+            </a:r>
+            <a:r>
+              <a:rPr lang="pt-PT" dirty="0"/>
+              <a:t> </a:t>
+            </a:r>
+            <a:r>
+              <a:rPr lang="pt-PT" dirty="0" err="1"/>
+              <a:t>of</a:t>
+            </a:r>
+            <a:r>
+              <a:rPr lang="pt-PT" dirty="0"/>
+              <a:t> </a:t>
+            </a:r>
+            <a:r>
+              <a:rPr lang="pt-PT" dirty="0" err="1"/>
+              <a:t>this</a:t>
+            </a:r>
+            <a:r>
+              <a:rPr lang="pt-PT" dirty="0"/>
+              <a:t> </a:t>
+            </a:r>
+            <a:r>
+              <a:rPr lang="pt-PT" dirty="0" err="1"/>
+              <a:t>project</a:t>
+            </a:r>
+            <a:endParaRPr lang="pt-PT" dirty="0"/>
+          </a:p>
+          <a:p>
+            <a:r>
+              <a:rPr lang="pt-PT" dirty="0" err="1"/>
+              <a:t>Next</a:t>
+            </a:r>
+            <a:r>
+              <a:rPr lang="pt-PT" dirty="0"/>
+              <a:t> </a:t>
+            </a:r>
+            <a:r>
+              <a:rPr lang="pt-PT" dirty="0" err="1"/>
+              <a:t>we</a:t>
+            </a:r>
+            <a:r>
+              <a:rPr lang="pt-PT" dirty="0"/>
+              <a:t> </a:t>
+            </a:r>
+            <a:r>
+              <a:rPr lang="pt-PT" dirty="0" err="1"/>
+              <a:t>ask</a:t>
+            </a:r>
+            <a:r>
+              <a:rPr lang="pt-PT" dirty="0"/>
+              <a:t> some </a:t>
+            </a:r>
+            <a:r>
+              <a:rPr lang="pt-PT" dirty="0" err="1"/>
+              <a:t>secondary</a:t>
+            </a:r>
+            <a:r>
+              <a:rPr lang="pt-PT" dirty="0"/>
+              <a:t> </a:t>
+            </a:r>
+            <a:r>
+              <a:rPr lang="pt-PT" dirty="0" err="1"/>
+              <a:t>question</a:t>
+            </a:r>
+            <a:endParaRPr lang="pt-PT" dirty="0"/>
+          </a:p>
+        </p:txBody>
+      </p:sp>
+      <p:sp>
+        <p:nvSpPr>
+          <p:cNvPr id="4" name="Marcador de Posição do Número do Diapositivo 3"/>
+          <p:cNvSpPr>
+            <a:spLocks noGrp="1"/>
+          </p:cNvSpPr>
+          <p:nvPr>
+            <p:ph type="sldNum" sz="quarter" idx="5"/>
+          </p:nvPr>
+        </p:nvSpPr>
+        <p:spPr/>
+        <p:txBody>
+          <a:bodyPr/>
+          <a:lstStyle/>
+          <a:p>
+            <a:fld id="{BDBD5865-30E7-487F-A6A0-BDA0A6CF9924}" type="slidenum">
+              <a:rPr lang="pt-PT" smtClean="0"/>
+              <a:t>3</a:t>
+            </a:fld>
+            <a:endParaRPr lang="pt-PT"/>
+          </a:p>
+        </p:txBody>
+      </p:sp>
+    </p:spTree>
+    <p:extLst>
+      <p:ext uri="{BB962C8B-B14F-4D97-AF65-F5344CB8AC3E}">
+        <p14:creationId xmlns:p14="http://schemas.microsoft.com/office/powerpoint/2010/main" val="2424801836"/>
+      </p:ext>
+    </p:extLst>
+  </p:cSld>
+  <p:clrMapOvr>
+    <a:masterClrMapping/>
+  </p:clrMapOvr>
+</p:notes>
+</file>
+
+<file path=ppt/notesSlides/notesSlide3.xml><?xml version="1.0" encoding="utf-8"?>
+<p:notes xmlns:a="http://schemas.openxmlformats.org/drawingml/2006/main" xmlns:r="http://schemas.openxmlformats.org/officeDocument/2006/relationships" xmlns:p="http://schemas.openxmlformats.org/presentationml/2006/main">
+  <p:cSld>
+    <p:spTree>
+      <p:nvGrpSpPr>
+        <p:cNvPr id="1" name=""/>
+        <p:cNvGrpSpPr/>
+        <p:nvPr/>
+      </p:nvGrpSpPr>
+      <p:grpSpPr>
+        <a:xfrm>
+          <a:off x="0" y="0"/>
+          <a:ext cx="0" cy="0"/>
+          <a:chOff x="0" y="0"/>
+          <a:chExt cx="0" cy="0"/>
+        </a:xfrm>
+      </p:grpSpPr>
+      <p:sp>
+        <p:nvSpPr>
+          <p:cNvPr id="2" name="Marcador de Posição da Imagem do Diapositivo 1"/>
+          <p:cNvSpPr>
+            <a:spLocks noGrp="1" noRot="1" noChangeAspect="1"/>
+          </p:cNvSpPr>
+          <p:nvPr>
+            <p:ph type="sldImg"/>
+          </p:nvPr>
+        </p:nvSpPr>
+        <p:spPr/>
+      </p:sp>
+      <p:sp>
+        <p:nvSpPr>
+          <p:cNvPr id="3" name="Marcador de Posição de Notas 2"/>
+          <p:cNvSpPr>
+            <a:spLocks noGrp="1"/>
+          </p:cNvSpPr>
+          <p:nvPr>
+            <p:ph type="body" idx="1"/>
+          </p:nvPr>
+        </p:nvSpPr>
+        <p:spPr/>
+        <p:txBody>
+          <a:bodyPr/>
+          <a:lstStyle/>
+          <a:p>
+            <a:r>
+              <a:rPr lang="pt-PT" dirty="0" err="1"/>
+              <a:t>Specific</a:t>
+            </a:r>
+            <a:r>
+              <a:rPr lang="pt-PT" dirty="0"/>
+              <a:t> time </a:t>
+            </a:r>
+            <a:r>
+              <a:rPr lang="pt-PT" dirty="0" err="1"/>
+              <a:t>of</a:t>
+            </a:r>
+            <a:r>
+              <a:rPr lang="pt-PT" dirty="0"/>
+              <a:t> </a:t>
+            </a:r>
+            <a:r>
+              <a:rPr lang="pt-PT" dirty="0" err="1"/>
+              <a:t>the</a:t>
+            </a:r>
+            <a:r>
+              <a:rPr lang="pt-PT" dirty="0"/>
+              <a:t> </a:t>
+            </a:r>
+            <a:r>
+              <a:rPr lang="pt-PT" dirty="0" err="1"/>
+              <a:t>year</a:t>
+            </a:r>
+            <a:r>
+              <a:rPr lang="pt-PT" dirty="0"/>
+              <a:t> </a:t>
+            </a:r>
+            <a:r>
+              <a:rPr lang="pt-PT" dirty="0" err="1"/>
+              <a:t>where</a:t>
+            </a:r>
+            <a:r>
+              <a:rPr lang="pt-PT" dirty="0"/>
+              <a:t> crime </a:t>
+            </a:r>
+            <a:r>
+              <a:rPr lang="pt-PT" dirty="0" err="1"/>
+              <a:t>drops</a:t>
+            </a:r>
+            <a:r>
+              <a:rPr lang="pt-PT" dirty="0"/>
+              <a:t> </a:t>
+            </a:r>
+            <a:r>
+              <a:rPr lang="pt-PT" dirty="0" err="1"/>
+              <a:t>or</a:t>
+            </a:r>
+            <a:r>
+              <a:rPr lang="pt-PT" dirty="0"/>
+              <a:t> </a:t>
+            </a:r>
+            <a:r>
+              <a:rPr lang="pt-PT" dirty="0" err="1"/>
+              <a:t>peaks</a:t>
+            </a:r>
+            <a:r>
+              <a:rPr lang="pt-PT" dirty="0"/>
+              <a:t>?</a:t>
+            </a:r>
+          </a:p>
+          <a:p>
+            <a:r>
+              <a:rPr lang="pt-PT" dirty="0"/>
+              <a:t>Does </a:t>
+            </a:r>
+            <a:r>
+              <a:rPr lang="pt-PT" dirty="0" err="1"/>
+              <a:t>the</a:t>
+            </a:r>
+            <a:r>
+              <a:rPr lang="pt-PT" dirty="0"/>
+              <a:t> </a:t>
+            </a:r>
+            <a:r>
+              <a:rPr lang="pt-PT" dirty="0" err="1"/>
+              <a:t>police</a:t>
+            </a:r>
+            <a:r>
+              <a:rPr lang="pt-PT" dirty="0"/>
+              <a:t> </a:t>
+            </a:r>
+            <a:r>
+              <a:rPr lang="pt-PT" dirty="0" err="1"/>
+              <a:t>actually</a:t>
+            </a:r>
+            <a:r>
+              <a:rPr lang="pt-PT" dirty="0"/>
+              <a:t> </a:t>
+            </a:r>
+            <a:r>
+              <a:rPr lang="pt-PT" dirty="0" err="1"/>
+              <a:t>needs</a:t>
+            </a:r>
+            <a:r>
+              <a:rPr lang="pt-PT" dirty="0"/>
+              <a:t> funding? </a:t>
+            </a:r>
+            <a:r>
+              <a:rPr lang="pt-PT" dirty="0" err="1"/>
+              <a:t>Or</a:t>
+            </a:r>
+            <a:r>
+              <a:rPr lang="pt-PT" dirty="0"/>
+              <a:t> are </a:t>
+            </a:r>
+            <a:r>
+              <a:rPr lang="pt-PT" dirty="0" err="1"/>
+              <a:t>they</a:t>
+            </a:r>
+            <a:r>
+              <a:rPr lang="pt-PT" dirty="0"/>
+              <a:t> </a:t>
+            </a:r>
+            <a:r>
+              <a:rPr lang="pt-PT" dirty="0" err="1"/>
+              <a:t>just</a:t>
+            </a:r>
+            <a:r>
+              <a:rPr lang="pt-PT" dirty="0"/>
+              <a:t> </a:t>
+            </a:r>
+            <a:r>
+              <a:rPr lang="pt-PT" dirty="0" err="1"/>
+              <a:t>allocating</a:t>
+            </a:r>
+            <a:r>
+              <a:rPr lang="pt-PT" dirty="0"/>
+              <a:t> </a:t>
+            </a:r>
+            <a:r>
+              <a:rPr lang="pt-PT" dirty="0" err="1"/>
+              <a:t>their</a:t>
+            </a:r>
+            <a:r>
+              <a:rPr lang="pt-PT" dirty="0"/>
+              <a:t> </a:t>
+            </a:r>
+            <a:r>
+              <a:rPr lang="pt-PT" dirty="0" err="1"/>
+              <a:t>resources</a:t>
+            </a:r>
+            <a:r>
+              <a:rPr lang="pt-PT" dirty="0"/>
+              <a:t> </a:t>
+            </a:r>
+            <a:r>
+              <a:rPr lang="pt-PT" dirty="0" err="1"/>
+              <a:t>inneficiently</a:t>
+            </a:r>
+            <a:r>
+              <a:rPr lang="pt-PT" dirty="0"/>
+              <a:t>.</a:t>
+            </a:r>
+          </a:p>
+        </p:txBody>
+      </p:sp>
+      <p:sp>
+        <p:nvSpPr>
+          <p:cNvPr id="4" name="Marcador de Posição do Número do Diapositivo 3"/>
+          <p:cNvSpPr>
+            <a:spLocks noGrp="1"/>
+          </p:cNvSpPr>
+          <p:nvPr>
+            <p:ph type="sldNum" sz="quarter" idx="5"/>
+          </p:nvPr>
+        </p:nvSpPr>
+        <p:spPr/>
+        <p:txBody>
+          <a:bodyPr/>
+          <a:lstStyle/>
+          <a:p>
+            <a:fld id="{BDBD5865-30E7-487F-A6A0-BDA0A6CF9924}" type="slidenum">
+              <a:rPr lang="pt-PT" smtClean="0"/>
+              <a:t>4</a:t>
+            </a:fld>
+            <a:endParaRPr lang="pt-PT"/>
+          </a:p>
+        </p:txBody>
+      </p:sp>
+    </p:spTree>
+    <p:extLst>
+      <p:ext uri="{BB962C8B-B14F-4D97-AF65-F5344CB8AC3E}">
+        <p14:creationId xmlns:p14="http://schemas.microsoft.com/office/powerpoint/2010/main" val="235954889"/>
+      </p:ext>
+    </p:extLst>
+  </p:cSld>
+  <p:clrMapOvr>
+    <a:masterClrMapping/>
+  </p:clrMapOvr>
+</p:notes>
+</file>
+
+<file path=ppt/notesSlides/notesSlide4.xml><?xml version="1.0" encoding="utf-8"?>
+<p:notes xmlns:a="http://schemas.openxmlformats.org/drawingml/2006/main" xmlns:r="http://schemas.openxmlformats.org/officeDocument/2006/relationships" xmlns:p="http://schemas.openxmlformats.org/presentationml/2006/main">
+  <p:cSld>
+    <p:spTree>
+      <p:nvGrpSpPr>
+        <p:cNvPr id="1" name=""/>
+        <p:cNvGrpSpPr/>
+        <p:nvPr/>
+      </p:nvGrpSpPr>
+      <p:grpSpPr>
+        <a:xfrm>
+          <a:off x="0" y="0"/>
+          <a:ext cx="0" cy="0"/>
+          <a:chOff x="0" y="0"/>
+          <a:chExt cx="0" cy="0"/>
+        </a:xfrm>
+      </p:grpSpPr>
+      <p:sp>
+        <p:nvSpPr>
+          <p:cNvPr id="2" name="Marcador de Posição da Imagem do Diapositivo 1"/>
+          <p:cNvSpPr>
+            <a:spLocks noGrp="1" noRot="1" noChangeAspect="1"/>
+          </p:cNvSpPr>
+          <p:nvPr>
+            <p:ph type="sldImg"/>
+          </p:nvPr>
+        </p:nvSpPr>
+        <p:spPr/>
+      </p:sp>
+      <p:sp>
+        <p:nvSpPr>
+          <p:cNvPr id="3" name="Marcador de Posição de Notas 2"/>
+          <p:cNvSpPr>
+            <a:spLocks noGrp="1"/>
+          </p:cNvSpPr>
+          <p:nvPr>
+            <p:ph type="body" idx="1"/>
+          </p:nvPr>
+        </p:nvSpPr>
+        <p:spPr/>
+        <p:txBody>
+          <a:bodyPr/>
+          <a:lstStyle/>
+          <a:p>
+            <a:r>
+              <a:rPr lang="pt-PT" dirty="0" err="1"/>
+              <a:t>The</a:t>
+            </a:r>
+            <a:r>
+              <a:rPr lang="pt-PT" dirty="0"/>
+              <a:t> </a:t>
+            </a:r>
+            <a:r>
+              <a:rPr lang="pt-PT" dirty="0" err="1"/>
+              <a:t>seriousness</a:t>
+            </a:r>
+            <a:r>
+              <a:rPr lang="pt-PT" dirty="0"/>
+              <a:t> </a:t>
+            </a:r>
+            <a:r>
+              <a:rPr lang="pt-PT" dirty="0" err="1"/>
+              <a:t>of</a:t>
+            </a:r>
+            <a:r>
+              <a:rPr lang="pt-PT" dirty="0"/>
+              <a:t> </a:t>
+            </a:r>
+            <a:r>
+              <a:rPr lang="pt-PT" dirty="0" err="1"/>
+              <a:t>the</a:t>
+            </a:r>
+            <a:r>
+              <a:rPr lang="pt-PT" dirty="0"/>
+              <a:t> crimes </a:t>
+            </a:r>
+            <a:r>
+              <a:rPr lang="pt-PT" dirty="0" err="1"/>
+              <a:t>is</a:t>
+            </a:r>
+            <a:r>
+              <a:rPr lang="pt-PT" dirty="0"/>
+              <a:t> </a:t>
+            </a:r>
+            <a:r>
+              <a:rPr lang="pt-PT" dirty="0" err="1"/>
+              <a:t>the</a:t>
+            </a:r>
+            <a:r>
+              <a:rPr lang="pt-PT" dirty="0"/>
+              <a:t> </a:t>
+            </a:r>
+            <a:r>
+              <a:rPr lang="pt-PT" dirty="0" err="1"/>
+              <a:t>cornerstone</a:t>
+            </a:r>
+            <a:r>
+              <a:rPr lang="pt-PT" dirty="0"/>
+              <a:t> </a:t>
+            </a:r>
+            <a:r>
+              <a:rPr lang="pt-PT" dirty="0" err="1"/>
+              <a:t>of</a:t>
+            </a:r>
+            <a:r>
+              <a:rPr lang="pt-PT" dirty="0"/>
+              <a:t> </a:t>
+            </a:r>
+            <a:r>
+              <a:rPr lang="pt-PT" dirty="0" err="1"/>
+              <a:t>our</a:t>
+            </a:r>
+            <a:r>
+              <a:rPr lang="pt-PT" dirty="0"/>
+              <a:t> </a:t>
+            </a:r>
+            <a:r>
+              <a:rPr lang="pt-PT" dirty="0" err="1"/>
+              <a:t>project</a:t>
+            </a:r>
+            <a:r>
+              <a:rPr lang="pt-PT" dirty="0"/>
+              <a:t> </a:t>
+            </a:r>
+            <a:r>
+              <a:rPr lang="pt-PT" dirty="0" err="1"/>
+              <a:t>so</a:t>
+            </a:r>
+            <a:r>
+              <a:rPr lang="pt-PT" dirty="0"/>
+              <a:t> </a:t>
+            </a:r>
+            <a:r>
+              <a:rPr lang="pt-PT" dirty="0" err="1"/>
+              <a:t>it</a:t>
+            </a:r>
+            <a:r>
+              <a:rPr lang="pt-PT" dirty="0"/>
+              <a:t> </a:t>
+            </a:r>
+            <a:r>
+              <a:rPr lang="pt-PT" dirty="0" err="1"/>
+              <a:t>is</a:t>
+            </a:r>
+            <a:r>
+              <a:rPr lang="pt-PT" dirty="0"/>
+              <a:t> </a:t>
+            </a:r>
+            <a:r>
+              <a:rPr lang="pt-PT" dirty="0" err="1"/>
+              <a:t>very</a:t>
+            </a:r>
+            <a:r>
+              <a:rPr lang="pt-PT" dirty="0"/>
+              <a:t> </a:t>
+            </a:r>
+            <a:r>
+              <a:rPr lang="pt-PT" dirty="0" err="1"/>
+              <a:t>important</a:t>
+            </a:r>
+            <a:r>
+              <a:rPr lang="pt-PT" dirty="0"/>
+              <a:t> to define </a:t>
+            </a:r>
+            <a:r>
+              <a:rPr lang="pt-PT" dirty="0" err="1"/>
+              <a:t>it</a:t>
+            </a:r>
+            <a:r>
+              <a:rPr lang="pt-PT" dirty="0"/>
+              <a:t> </a:t>
+            </a:r>
+            <a:r>
+              <a:rPr lang="pt-PT" dirty="0" err="1"/>
+              <a:t>properly</a:t>
+            </a:r>
+            <a:r>
+              <a:rPr lang="pt-PT" dirty="0"/>
+              <a:t>, </a:t>
+            </a:r>
+            <a:r>
+              <a:rPr lang="pt-PT" dirty="0" err="1"/>
+              <a:t>because</a:t>
+            </a:r>
+            <a:r>
+              <a:rPr lang="pt-PT" dirty="0"/>
+              <a:t> </a:t>
+            </a:r>
+            <a:r>
+              <a:rPr lang="pt-PT" dirty="0" err="1"/>
+              <a:t>we</a:t>
+            </a:r>
+            <a:r>
+              <a:rPr lang="pt-PT" dirty="0"/>
+              <a:t> </a:t>
+            </a:r>
+            <a:r>
+              <a:rPr lang="pt-PT" dirty="0" err="1"/>
+              <a:t>need</a:t>
+            </a:r>
+            <a:r>
+              <a:rPr lang="pt-PT" dirty="0"/>
+              <a:t> </a:t>
+            </a:r>
+            <a:r>
+              <a:rPr lang="pt-PT" dirty="0" err="1"/>
+              <a:t>it</a:t>
+            </a:r>
+            <a:r>
+              <a:rPr lang="pt-PT" dirty="0"/>
+              <a:t> to define </a:t>
+            </a:r>
+            <a:r>
+              <a:rPr lang="pt-PT" dirty="0" err="1"/>
+              <a:t>the</a:t>
+            </a:r>
+            <a:r>
+              <a:rPr lang="pt-PT" dirty="0"/>
+              <a:t> </a:t>
+            </a:r>
+            <a:r>
+              <a:rPr lang="pt-PT" dirty="0" err="1"/>
+              <a:t>safety</a:t>
+            </a:r>
+            <a:r>
+              <a:rPr lang="pt-PT" dirty="0"/>
+              <a:t> </a:t>
+            </a:r>
+            <a:r>
+              <a:rPr lang="pt-PT" dirty="0" err="1"/>
+              <a:t>of</a:t>
+            </a:r>
+            <a:r>
+              <a:rPr lang="pt-PT" dirty="0"/>
+              <a:t> a </a:t>
+            </a:r>
+            <a:r>
+              <a:rPr lang="pt-PT" dirty="0" err="1"/>
+              <a:t>district</a:t>
+            </a:r>
+            <a:r>
+              <a:rPr lang="pt-PT" dirty="0"/>
+              <a:t> </a:t>
+            </a:r>
+            <a:r>
+              <a:rPr lang="pt-PT" dirty="0" err="1"/>
+              <a:t>that</a:t>
+            </a:r>
+            <a:r>
+              <a:rPr lang="pt-PT" dirty="0"/>
+              <a:t> </a:t>
+            </a:r>
+            <a:r>
+              <a:rPr lang="pt-PT" dirty="0" err="1"/>
+              <a:t>will</a:t>
+            </a:r>
+            <a:r>
+              <a:rPr lang="pt-PT" dirty="0"/>
+              <a:t> </a:t>
+            </a:r>
+            <a:r>
+              <a:rPr lang="pt-PT" dirty="0" err="1"/>
+              <a:t>allow</a:t>
+            </a:r>
+            <a:r>
+              <a:rPr lang="pt-PT" dirty="0"/>
+              <a:t> </a:t>
+            </a:r>
+            <a:r>
+              <a:rPr lang="pt-PT" dirty="0" err="1"/>
+              <a:t>us</a:t>
+            </a:r>
+            <a:r>
+              <a:rPr lang="pt-PT" dirty="0"/>
+              <a:t> to </a:t>
+            </a:r>
+            <a:r>
+              <a:rPr lang="pt-PT" dirty="0" err="1"/>
+              <a:t>answer</a:t>
+            </a:r>
+            <a:r>
+              <a:rPr lang="pt-PT" dirty="0"/>
+              <a:t> </a:t>
+            </a:r>
+            <a:r>
+              <a:rPr lang="pt-PT" dirty="0" err="1"/>
+              <a:t>the</a:t>
+            </a:r>
+            <a:r>
+              <a:rPr lang="pt-PT" dirty="0"/>
+              <a:t> </a:t>
+            </a:r>
+            <a:r>
+              <a:rPr lang="pt-PT" dirty="0" err="1"/>
+              <a:t>previous</a:t>
+            </a:r>
+            <a:r>
+              <a:rPr lang="pt-PT" dirty="0"/>
+              <a:t> </a:t>
+            </a:r>
+            <a:r>
+              <a:rPr lang="pt-PT" dirty="0" err="1"/>
+              <a:t>questions</a:t>
+            </a:r>
+            <a:r>
+              <a:rPr lang="pt-PT" dirty="0"/>
+              <a:t>.</a:t>
+            </a:r>
+          </a:p>
+          <a:p>
+            <a:r>
+              <a:rPr lang="pt-PT" dirty="0" err="1"/>
+              <a:t>Scale</a:t>
+            </a:r>
+            <a:r>
+              <a:rPr lang="pt-PT" dirty="0"/>
+              <a:t> </a:t>
+            </a:r>
+            <a:r>
+              <a:rPr lang="pt-PT" dirty="0" err="1"/>
+              <a:t>seriousness</a:t>
+            </a:r>
+            <a:r>
+              <a:rPr lang="pt-PT" dirty="0"/>
+              <a:t> </a:t>
+            </a:r>
+            <a:r>
+              <a:rPr lang="pt-PT" dirty="0" err="1"/>
+              <a:t>of</a:t>
+            </a:r>
+            <a:r>
+              <a:rPr lang="pt-PT" dirty="0"/>
+              <a:t> crime </a:t>
+            </a:r>
+            <a:r>
+              <a:rPr lang="pt-PT" dirty="0" err="1"/>
+              <a:t>according</a:t>
+            </a:r>
+            <a:r>
+              <a:rPr lang="pt-PT" dirty="0"/>
+              <a:t> to </a:t>
+            </a:r>
+            <a:r>
+              <a:rPr lang="pt-PT" dirty="0" err="1"/>
+              <a:t>the</a:t>
+            </a:r>
+            <a:r>
+              <a:rPr lang="pt-PT" dirty="0"/>
+              <a:t> ICCS </a:t>
+            </a:r>
+            <a:r>
+              <a:rPr lang="pt-PT" dirty="0" err="1"/>
+              <a:t>and</a:t>
+            </a:r>
+            <a:r>
+              <a:rPr lang="pt-PT" dirty="0"/>
+              <a:t> a </a:t>
+            </a:r>
+            <a:r>
+              <a:rPr lang="pt-PT" dirty="0" err="1"/>
+              <a:t>few</a:t>
+            </a:r>
+            <a:r>
+              <a:rPr lang="pt-PT" dirty="0"/>
+              <a:t> </a:t>
+            </a:r>
+            <a:r>
+              <a:rPr lang="pt-PT" dirty="0" err="1"/>
+              <a:t>studies</a:t>
+            </a:r>
+            <a:r>
+              <a:rPr lang="pt-PT" dirty="0"/>
+              <a:t> </a:t>
+            </a:r>
+            <a:r>
+              <a:rPr lang="pt-PT" dirty="0" err="1"/>
+              <a:t>about</a:t>
+            </a:r>
+            <a:r>
+              <a:rPr lang="pt-PT" dirty="0"/>
+              <a:t> </a:t>
+            </a:r>
+            <a:r>
+              <a:rPr lang="pt-PT" dirty="0" err="1"/>
+              <a:t>public</a:t>
+            </a:r>
+            <a:r>
+              <a:rPr lang="pt-PT" dirty="0"/>
+              <a:t> </a:t>
+            </a:r>
+            <a:r>
+              <a:rPr lang="pt-PT" dirty="0" err="1"/>
+              <a:t>safety</a:t>
+            </a:r>
+            <a:r>
+              <a:rPr lang="pt-PT" dirty="0"/>
+              <a:t>. (</a:t>
+            </a:r>
+            <a:r>
+              <a:rPr lang="pt-PT" dirty="0" err="1"/>
+              <a:t>Sellin</a:t>
+            </a:r>
+            <a:r>
+              <a:rPr lang="pt-PT" dirty="0"/>
+              <a:t>-Wolfgang </a:t>
+            </a:r>
+            <a:r>
+              <a:rPr lang="pt-PT" dirty="0" err="1"/>
+              <a:t>Scale</a:t>
+            </a:r>
+            <a:r>
+              <a:rPr lang="pt-PT" dirty="0"/>
+              <a:t>)</a:t>
+            </a:r>
+          </a:p>
+          <a:p>
+            <a:r>
+              <a:rPr lang="pt-PT" dirty="0" err="1"/>
+              <a:t>From</a:t>
+            </a:r>
+            <a:r>
+              <a:rPr lang="pt-PT" dirty="0"/>
+              <a:t> </a:t>
+            </a:r>
+            <a:r>
+              <a:rPr lang="pt-PT" dirty="0" err="1"/>
+              <a:t>this</a:t>
+            </a:r>
+            <a:r>
+              <a:rPr lang="pt-PT" dirty="0"/>
+              <a:t> </a:t>
+            </a:r>
+            <a:r>
+              <a:rPr lang="pt-PT" dirty="0" err="1"/>
+              <a:t>model</a:t>
+            </a:r>
+            <a:r>
+              <a:rPr lang="pt-PT" dirty="0"/>
+              <a:t> </a:t>
+            </a:r>
+            <a:r>
+              <a:rPr lang="pt-PT" dirty="0" err="1"/>
+              <a:t>we</a:t>
+            </a:r>
+            <a:r>
+              <a:rPr lang="pt-PT" dirty="0"/>
+              <a:t> </a:t>
+            </a:r>
+            <a:r>
+              <a:rPr lang="pt-PT" dirty="0" err="1"/>
+              <a:t>will</a:t>
+            </a:r>
+            <a:r>
+              <a:rPr lang="pt-PT" dirty="0"/>
+              <a:t> </a:t>
+            </a:r>
+            <a:r>
+              <a:rPr lang="pt-PT" dirty="0" err="1"/>
+              <a:t>try</a:t>
+            </a:r>
+            <a:r>
+              <a:rPr lang="pt-PT" dirty="0"/>
+              <a:t> to </a:t>
+            </a:r>
+            <a:r>
+              <a:rPr lang="pt-PT" dirty="0" err="1"/>
+              <a:t>create</a:t>
+            </a:r>
+            <a:r>
+              <a:rPr lang="pt-PT" dirty="0"/>
+              <a:t> a </a:t>
+            </a:r>
+            <a:r>
+              <a:rPr lang="pt-PT" dirty="0" err="1"/>
+              <a:t>function</a:t>
+            </a:r>
+            <a:r>
+              <a:rPr lang="pt-PT" dirty="0"/>
+              <a:t> </a:t>
+            </a:r>
+            <a:r>
+              <a:rPr lang="pt-PT" dirty="0" err="1"/>
+              <a:t>where</a:t>
+            </a:r>
+            <a:r>
+              <a:rPr lang="pt-PT" dirty="0"/>
+              <a:t> </a:t>
+            </a:r>
+            <a:r>
+              <a:rPr lang="pt-PT" dirty="0" err="1"/>
+              <a:t>we</a:t>
+            </a:r>
+            <a:r>
+              <a:rPr lang="pt-PT" dirty="0"/>
+              <a:t> </a:t>
+            </a:r>
+            <a:r>
+              <a:rPr lang="pt-PT" dirty="0" err="1"/>
+              <a:t>weigh</a:t>
+            </a:r>
+            <a:r>
+              <a:rPr lang="pt-PT" dirty="0"/>
+              <a:t> </a:t>
+            </a:r>
+            <a:r>
+              <a:rPr lang="pt-PT" dirty="0" err="1"/>
+              <a:t>each</a:t>
+            </a:r>
+            <a:r>
+              <a:rPr lang="pt-PT" dirty="0"/>
+              <a:t> </a:t>
+            </a:r>
+            <a:r>
+              <a:rPr lang="pt-PT" dirty="0" err="1"/>
+              <a:t>type</a:t>
+            </a:r>
+            <a:r>
+              <a:rPr lang="pt-PT" dirty="0"/>
+              <a:t> </a:t>
+            </a:r>
+            <a:r>
+              <a:rPr lang="pt-PT" dirty="0" err="1"/>
+              <a:t>of</a:t>
+            </a:r>
+            <a:r>
+              <a:rPr lang="pt-PT" dirty="0"/>
+              <a:t> crime </a:t>
+            </a:r>
+            <a:r>
+              <a:rPr lang="pt-PT" dirty="0" err="1"/>
+              <a:t>according</a:t>
+            </a:r>
+            <a:r>
+              <a:rPr lang="pt-PT" dirty="0"/>
+              <a:t> to </a:t>
+            </a:r>
+            <a:r>
+              <a:rPr lang="pt-PT" dirty="0" err="1"/>
+              <a:t>seriousness</a:t>
+            </a:r>
+            <a:r>
+              <a:rPr lang="pt-PT" dirty="0"/>
+              <a:t>, </a:t>
+            </a:r>
+            <a:r>
+              <a:rPr lang="pt-PT" dirty="0" err="1"/>
+              <a:t>producing</a:t>
+            </a:r>
+            <a:r>
+              <a:rPr lang="pt-PT" dirty="0"/>
+              <a:t> a </a:t>
+            </a:r>
+            <a:r>
+              <a:rPr lang="pt-PT" dirty="0" err="1"/>
+              <a:t>safety</a:t>
+            </a:r>
+            <a:r>
+              <a:rPr lang="pt-PT" dirty="0"/>
+              <a:t> </a:t>
+            </a:r>
+            <a:r>
+              <a:rPr lang="pt-PT" dirty="0" err="1"/>
+              <a:t>function</a:t>
+            </a:r>
+            <a:r>
+              <a:rPr lang="pt-PT" dirty="0"/>
+              <a:t>.</a:t>
+            </a:r>
+          </a:p>
+          <a:p>
+            <a:r>
+              <a:rPr lang="pt-PT" dirty="0" err="1"/>
+              <a:t>Try</a:t>
+            </a:r>
+            <a:r>
+              <a:rPr lang="pt-PT" dirty="0"/>
+              <a:t> to </a:t>
+            </a:r>
+            <a:r>
+              <a:rPr lang="pt-PT" dirty="0" err="1"/>
+              <a:t>maintain</a:t>
+            </a:r>
+            <a:r>
+              <a:rPr lang="pt-PT" dirty="0"/>
+              <a:t> </a:t>
+            </a:r>
+            <a:r>
+              <a:rPr lang="pt-PT" dirty="0" err="1"/>
+              <a:t>the</a:t>
+            </a:r>
+            <a:r>
+              <a:rPr lang="pt-PT" dirty="0"/>
+              <a:t> </a:t>
+            </a:r>
+            <a:r>
+              <a:rPr lang="pt-PT" dirty="0" err="1"/>
+              <a:t>distribution</a:t>
+            </a:r>
+            <a:r>
+              <a:rPr lang="pt-PT" dirty="0"/>
+              <a:t> </a:t>
+            </a:r>
+            <a:r>
+              <a:rPr lang="pt-PT" dirty="0" err="1"/>
+              <a:t>of</a:t>
+            </a:r>
+            <a:r>
+              <a:rPr lang="pt-PT" dirty="0"/>
+              <a:t> </a:t>
+            </a:r>
+            <a:r>
+              <a:rPr lang="pt-PT" dirty="0" err="1"/>
+              <a:t>the</a:t>
+            </a:r>
+            <a:r>
+              <a:rPr lang="pt-PT" dirty="0"/>
+              <a:t> </a:t>
+            </a:r>
+            <a:r>
+              <a:rPr lang="pt-PT" dirty="0" err="1"/>
+              <a:t>population</a:t>
+            </a:r>
+            <a:r>
+              <a:rPr lang="pt-PT" dirty="0"/>
+              <a:t> in </a:t>
+            </a:r>
+            <a:r>
+              <a:rPr lang="pt-PT" dirty="0" err="1"/>
+              <a:t>the</a:t>
+            </a:r>
+            <a:r>
+              <a:rPr lang="pt-PT" dirty="0"/>
+              <a:t> sample. (25% </a:t>
+            </a:r>
+            <a:r>
+              <a:rPr lang="pt-PT" dirty="0" err="1"/>
+              <a:t>of</a:t>
+            </a:r>
+            <a:r>
+              <a:rPr lang="pt-PT" dirty="0"/>
+              <a:t> </a:t>
+            </a:r>
+            <a:r>
+              <a:rPr lang="pt-PT" dirty="0" err="1"/>
+              <a:t>size</a:t>
+            </a:r>
+            <a:r>
+              <a:rPr lang="pt-PT" dirty="0"/>
+              <a:t>)</a:t>
+            </a:r>
+          </a:p>
+        </p:txBody>
+      </p:sp>
+      <p:sp>
+        <p:nvSpPr>
+          <p:cNvPr id="4" name="Marcador de Posição do Número do Diapositivo 3"/>
+          <p:cNvSpPr>
+            <a:spLocks noGrp="1"/>
+          </p:cNvSpPr>
+          <p:nvPr>
+            <p:ph type="sldNum" sz="quarter" idx="5"/>
+          </p:nvPr>
+        </p:nvSpPr>
+        <p:spPr/>
+        <p:txBody>
+          <a:bodyPr/>
+          <a:lstStyle/>
+          <a:p>
+            <a:fld id="{BDBD5865-30E7-487F-A6A0-BDA0A6CF9924}" type="slidenum">
+              <a:rPr lang="pt-PT" smtClean="0"/>
+              <a:t>8</a:t>
+            </a:fld>
+            <a:endParaRPr lang="pt-PT"/>
+          </a:p>
+        </p:txBody>
+      </p:sp>
+    </p:spTree>
+    <p:extLst>
+      <p:ext uri="{BB962C8B-B14F-4D97-AF65-F5344CB8AC3E}">
+        <p14:creationId xmlns:p14="http://schemas.microsoft.com/office/powerpoint/2010/main" val="2193743957"/>
+      </p:ext>
+    </p:extLst>
+  </p:cSld>
+  <p:clrMapOvr>
+    <a:masterClrMapping/>
+  </p:clrMapOvr>
+</p:notes>
+</file>
+
 <file path=ppt/slideLayouts/slideLayout1.xml><?xml version="1.0" encoding="utf-8"?>
 <p:sldLayout xmlns:a="http://schemas.openxmlformats.org/drawingml/2006/main" xmlns:r="http://schemas.openxmlformats.org/officeDocument/2006/relationships" xmlns:p="http://schemas.openxmlformats.org/presentationml/2006/main" type="title" preserve="1">
   <p:cSld name="Title Slide">
@@ -250,7 +2157,7 @@
           <a:p>
             <a:fld id="{88D38747-4367-4BD2-8D51-C97E202738E2}" type="datetime1">
               <a:rPr lang="en-US" smtClean="0"/>
-              <a:t>11/6/2019</a:t>
+              <a:t>11/7/2019</a:t>
             </a:fld>
             <a:endParaRPr lang="en-US" dirty="0"/>
           </a:p>
@@ -421,7 +2328,7 @@
           <a:p>
             <a:fld id="{217E833E-1B6D-415F-AD29-75AE8C43BD0D}" type="datetime1">
               <a:rPr lang="en-US" smtClean="0"/>
-              <a:t>11/6/2019</a:t>
+              <a:t>11/7/2019</a:t>
             </a:fld>
             <a:endParaRPr lang="en-US" dirty="0"/>
           </a:p>
@@ -601,7 +2508,7 @@
           <a:p>
             <a:fld id="{8452596F-08A7-4B70-989A-F2B1CF31E66B}" type="datetime1">
               <a:rPr lang="en-US" smtClean="0"/>
-              <a:t>11/6/2019</a:t>
+              <a:t>11/7/2019</a:t>
             </a:fld>
             <a:endParaRPr lang="en-US" dirty="0"/>
           </a:p>
@@ -771,7 +2678,7 @@
           <a:p>
             <a:fld id="{73C55A3C-5767-4844-A0A3-83778C2E5409}" type="datetime1">
               <a:rPr lang="en-US" smtClean="0"/>
-              <a:t>11/6/2019</a:t>
+              <a:t>11/7/2019</a:t>
             </a:fld>
             <a:endParaRPr lang="en-US" dirty="0"/>
           </a:p>
@@ -1065,7 +2972,7 @@
           <a:p>
             <a:fld id="{CAE507A8-A5CF-4D38-AB86-7EDDA87A85D4}" type="datetime1">
               <a:rPr lang="en-US" smtClean="0"/>
-              <a:t>11/6/2019</a:t>
+              <a:t>11/7/2019</a:t>
             </a:fld>
             <a:endParaRPr lang="en-US" dirty="0"/>
           </a:p>
@@ -1298,7 +3205,7 @@
           <a:p>
             <a:fld id="{BDFCD27C-8599-43EF-BA1D-14DDC1946E06}" type="datetime1">
               <a:rPr lang="en-US" smtClean="0"/>
-              <a:t>11/6/2019</a:t>
+              <a:t>11/7/2019</a:t>
             </a:fld>
             <a:endParaRPr lang="en-US" dirty="0"/>
           </a:p>
@@ -1665,7 +3572,7 @@
           <a:p>
             <a:fld id="{49343D99-809A-49C0-96E5-4250D0B498EE}" type="datetime1">
               <a:rPr lang="en-US" smtClean="0"/>
-              <a:t>11/6/2019</a:t>
+              <a:t>11/7/2019</a:t>
             </a:fld>
             <a:endParaRPr lang="en-US" dirty="0"/>
           </a:p>
@@ -1783,7 +3690,7 @@
           <a:p>
             <a:fld id="{A143DE9B-B678-4EFB-BB7D-A4370204A0B0}" type="datetime1">
               <a:rPr lang="en-US" smtClean="0"/>
-              <a:t>11/6/2019</a:t>
+              <a:t>11/7/2019</a:t>
             </a:fld>
             <a:endParaRPr lang="en-US" dirty="0"/>
           </a:p>
@@ -1878,7 +3785,7 @@
           <a:p>
             <a:fld id="{E68812DA-F765-4142-A6A3-A8ED7235E082}" type="datetime1">
               <a:rPr lang="en-US" smtClean="0"/>
-              <a:t>11/6/2019</a:t>
+              <a:t>11/7/2019</a:t>
             </a:fld>
             <a:endParaRPr lang="en-US" dirty="0"/>
           </a:p>
@@ -2155,7 +4062,7 @@
           <a:p>
             <a:fld id="{3E0277FD-7DE6-41D4-930D-AC99F5AFE54E}" type="datetime1">
               <a:rPr lang="en-US" smtClean="0"/>
-              <a:t>11/6/2019</a:t>
+              <a:t>11/7/2019</a:t>
             </a:fld>
             <a:endParaRPr lang="en-US" dirty="0"/>
           </a:p>
@@ -2409,7 +4316,7 @@
           <a:p>
             <a:fld id="{9EA15526-7079-4B7B-987C-1B5FAE11A0FF}" type="datetime1">
               <a:rPr lang="en-US" smtClean="0"/>
-              <a:t>11/6/2019</a:t>
+              <a:t>11/7/2019</a:t>
             </a:fld>
             <a:endParaRPr lang="en-US" dirty="0"/>
           </a:p>
@@ -2623,7 +4530,7 @@
           <a:p>
             <a:fld id="{073ED0CC-082F-4160-86E5-0D6041F12778}" type="datetime1">
               <a:rPr lang="en-US" smtClean="0"/>
-              <a:t>11/6/2019</a:t>
+              <a:t>11/7/2019</a:t>
             </a:fld>
             <a:endParaRPr lang="en-US" dirty="0"/>
           </a:p>
@@ -3289,7 +5196,25 @@
               <a:rPr lang="pt-PT" sz="3600" dirty="0">
                 <a:latin typeface="Century Gothic" panose="020B0502020202020204" pitchFamily="34" charset="0"/>
               </a:rPr>
-              <a:t>Project Proposal</a:t>
+              <a:t>Project </a:t>
+            </a:r>
+            <a:r>
+              <a:rPr lang="pt-PT" sz="3600" dirty="0" err="1">
+                <a:latin typeface="Century Gothic" panose="020B0502020202020204" pitchFamily="34" charset="0"/>
+              </a:rPr>
+              <a:t>Proposal</a:t>
+            </a:r>
+            <a:r>
+              <a:rPr lang="pt-PT" sz="3600" dirty="0">
+                <a:latin typeface="Century Gothic" panose="020B0502020202020204" pitchFamily="34" charset="0"/>
+              </a:rPr>
+              <a:t> </a:t>
+            </a:r>
+            <a:r>
+              <a:rPr lang="pt-PT" sz="2800" dirty="0">
+                <a:latin typeface="Century Gothic" panose="020B0502020202020204" pitchFamily="34" charset="0"/>
+              </a:rPr>
+              <a:t>2019</a:t>
             </a:r>
             <a:endParaRPr lang="pt-PT" sz="4800" dirty="0">
               <a:latin typeface="Century Gothic" panose="020B0502020202020204" pitchFamily="34" charset="0"/>
@@ -9616,7 +11541,7 @@
               <a:rPr lang="pt-PT" sz="2400" dirty="0" err="1">
                 <a:latin typeface="Century Gothic" panose="020B0502020202020204" pitchFamily="34" charset="0"/>
               </a:rPr>
-              <a:t>funds</a:t>
+              <a:t>resources</a:t>
             </a:r>
             <a:r>
               <a:rPr lang="pt-PT" sz="2400" dirty="0">
@@ -9709,14 +11634,17 @@
               <a:t> </a:t>
             </a:r>
             <a:r>
-              <a:rPr lang="pt-PT" sz="2400">
+              <a:rPr lang="pt-PT" sz="2400" dirty="0" err="1">
                 <a:latin typeface="Century Gothic" panose="020B0502020202020204" pitchFamily="34" charset="0"/>
               </a:rPr>
-              <a:t>section?</a:t>
-            </a:r>
-            <a:endParaRPr lang="pt-PT" sz="2400" dirty="0">
-              <a:latin typeface="Century Gothic" panose="020B0502020202020204" pitchFamily="34" charset="0"/>
-            </a:endParaRPr>
+              <a:t>section</a:t>
+            </a:r>
+            <a:r>
+              <a:rPr lang="pt-PT" sz="2400" dirty="0">
+                <a:latin typeface="Century Gothic" panose="020B0502020202020204" pitchFamily="34" charset="0"/>
+              </a:rPr>
+              <a:t>?</a:t>
+            </a:r>
           </a:p>
           <a:p>
             <a:pPr>
@@ -13086,6 +15014,14 @@
 <file path=ppt/slides/slide5.xml><?xml version="1.0" encoding="utf-8"?>
 <p:sld xmlns:a="http://schemas.openxmlformats.org/drawingml/2006/main" xmlns:r="http://schemas.openxmlformats.org/officeDocument/2006/relationships" xmlns:p="http://schemas.openxmlformats.org/presentationml/2006/main">
   <p:cSld>
+    <p:bg>
+      <p:bgPr>
+        <a:solidFill>
+          <a:schemeClr val="bg1"/>
+        </a:solidFill>
+        <a:effectLst/>
+      </p:bgPr>
+    </p:bg>
     <p:spTree>
       <p:nvGrpSpPr>
         <p:cNvPr id="1" name=""/>
@@ -13102,196 +15038,46 @@
       </p:grpSpPr>
       <p:pic>
         <p:nvPicPr>
-          <p:cNvPr id="4" name="Picture 3"/>
+          <p:cNvPr id="5" name="Marcador de Posição de Conteúdo 4" descr="Uma imagem com captura de ecrã, pássaro&#10;&#10;Descrição gerada automaticamente">
+            <a:extLst>
+              <a:ext uri="{FF2B5EF4-FFF2-40B4-BE49-F238E27FC236}">
+                <a16:creationId xmlns:a16="http://schemas.microsoft.com/office/drawing/2014/main" id="{95C4288A-2508-4C45-B6B1-03113552C32F}"/>
+              </a:ext>
+            </a:extLst>
+          </p:cNvPr>
           <p:cNvPicPr>
-            <a:picLocks noChangeAspect="1"/>
+            <a:picLocks noGrp="1" noChangeAspect="1"/>
           </p:cNvPicPr>
-          <p:nvPr/>
+          <p:nvPr>
+            <p:ph idx="1"/>
+          </p:nvPr>
         </p:nvPicPr>
-        <p:blipFill rotWithShape="1">
-          <a:blip r:embed="rId2"/>
-          <a:srcRect l="2292" t="16439" r="43913" b="15656"/>
-          <a:stretch/>
+        <p:blipFill>
+          <a:blip r:embed="rId2">
+            <a:extLst>
+              <a:ext uri="{28A0092B-C50C-407E-A947-70E740481C1C}">
+                <a14:useLocalDpi xmlns:a14="http://schemas.microsoft.com/office/drawing/2010/main" val="0"/>
+              </a:ext>
+            </a:extLst>
+          </a:blip>
+          <a:stretch>
+            <a:fillRect/>
+          </a:stretch>
         </p:blipFill>
         <p:spPr>
           <a:xfrm>
-            <a:off x="7905750" y="2222500"/>
-            <a:ext cx="3829050" cy="2448082"/>
+            <a:off x="3310466" y="643466"/>
+            <a:ext cx="5571067" cy="5571067"/>
           </a:xfrm>
           <a:prstGeom prst="rect">
             <a:avLst/>
           </a:prstGeom>
         </p:spPr>
       </p:pic>
-      <p:sp>
-        <p:nvSpPr>
-          <p:cNvPr id="2" name="Título 1">
-            <a:extLst>
-              <a:ext uri="{FF2B5EF4-FFF2-40B4-BE49-F238E27FC236}">
-                <a16:creationId xmlns:a16="http://schemas.microsoft.com/office/drawing/2014/main" id="{B444DAE9-063B-485F-915E-778F7D0E1CC1}"/>
-              </a:ext>
-            </a:extLst>
-          </p:cNvPr>
-          <p:cNvSpPr>
-            <a:spLocks noGrp="1"/>
-          </p:cNvSpPr>
-          <p:nvPr>
-            <p:ph type="title"/>
-          </p:nvPr>
-        </p:nvSpPr>
-        <p:spPr>
-          <a:xfrm>
-            <a:off x="838200" y="365918"/>
-            <a:ext cx="10515600" cy="1325563"/>
-          </a:xfrm>
-        </p:spPr>
-        <p:txBody>
-          <a:bodyPr>
-            <a:normAutofit/>
-          </a:bodyPr>
-          <a:lstStyle/>
-          <a:p>
-            <a:r>
-              <a:rPr lang="pt-PT" sz="4000" dirty="0">
-                <a:latin typeface="Century Gothic" panose="020B0502020202020204" pitchFamily="34" charset="0"/>
-              </a:rPr>
-              <a:t>Placing hypothesis</a:t>
-            </a:r>
-          </a:p>
-        </p:txBody>
-      </p:sp>
-      <p:sp>
-        <p:nvSpPr>
-          <p:cNvPr id="3" name="Marcador de Posição de Conteúdo 2">
-            <a:extLst>
-              <a:ext uri="{FF2B5EF4-FFF2-40B4-BE49-F238E27FC236}">
-                <a16:creationId xmlns:a16="http://schemas.microsoft.com/office/drawing/2014/main" id="{DAC13582-5694-454F-816D-1164D422E1AA}"/>
-              </a:ext>
-            </a:extLst>
-          </p:cNvPr>
-          <p:cNvSpPr>
-            <a:spLocks noGrp="1"/>
-          </p:cNvSpPr>
-          <p:nvPr>
-            <p:ph idx="1"/>
-          </p:nvPr>
-        </p:nvSpPr>
-        <p:spPr>
-          <a:xfrm>
-            <a:off x="838200" y="1879601"/>
-            <a:ext cx="7429500" cy="4351338"/>
-          </a:xfrm>
-        </p:spPr>
-        <p:txBody>
-          <a:bodyPr>
-            <a:normAutofit/>
-          </a:bodyPr>
-          <a:lstStyle/>
-          <a:p>
-            <a:pPr>
-              <a:spcBef>
-                <a:spcPts val="3000"/>
-              </a:spcBef>
-            </a:pPr>
-            <a:r>
-              <a:rPr lang="en-US" sz="2400" dirty="0">
-                <a:latin typeface="Century Gothic" panose="020B0502020202020204" pitchFamily="34" charset="0"/>
-              </a:rPr>
-              <a:t>We believe crime has decreased in general terms, but there might be </a:t>
-            </a:r>
-            <a:r>
-              <a:rPr lang="en-US" sz="2400" b="1" dirty="0">
-                <a:latin typeface="Century Gothic" panose="020B0502020202020204" pitchFamily="34" charset="0"/>
-              </a:rPr>
-              <a:t>differences across segments</a:t>
-            </a:r>
-            <a:r>
-              <a:rPr lang="en-US" sz="2400" dirty="0">
-                <a:latin typeface="Century Gothic" panose="020B0502020202020204" pitchFamily="34" charset="0"/>
-              </a:rPr>
-              <a:t>. </a:t>
-            </a:r>
-          </a:p>
-          <a:p>
-            <a:pPr>
-              <a:spcBef>
-                <a:spcPts val="3000"/>
-              </a:spcBef>
-            </a:pPr>
-            <a:r>
-              <a:rPr lang="en-US" sz="2400" dirty="0">
-                <a:latin typeface="Century Gothic" panose="020B0502020202020204" pitchFamily="34" charset="0"/>
-              </a:rPr>
-              <a:t>We believe the police might </a:t>
-            </a:r>
-            <a:r>
-              <a:rPr lang="en-US" sz="2400" b="1" dirty="0">
-                <a:latin typeface="Century Gothic" panose="020B0502020202020204" pitchFamily="34" charset="0"/>
-              </a:rPr>
-              <a:t>not be addressing </a:t>
-            </a:r>
-            <a:r>
-              <a:rPr lang="en-US" sz="2400" dirty="0">
-                <a:latin typeface="Century Gothic" panose="020B0502020202020204" pitchFamily="34" charset="0"/>
-              </a:rPr>
-              <a:t>crime types in proportion to their </a:t>
-            </a:r>
-            <a:r>
-              <a:rPr lang="en-US" sz="2400" b="1" dirty="0">
-                <a:latin typeface="Century Gothic" panose="020B0502020202020204" pitchFamily="34" charset="0"/>
-              </a:rPr>
-              <a:t>volume/seriousness</a:t>
-            </a:r>
-            <a:r>
-              <a:rPr lang="en-US" sz="2400" dirty="0">
-                <a:latin typeface="Century Gothic" panose="020B0502020202020204" pitchFamily="34" charset="0"/>
-              </a:rPr>
-              <a:t>.</a:t>
-            </a:r>
-          </a:p>
-          <a:p>
-            <a:pPr>
-              <a:spcBef>
-                <a:spcPts val="3000"/>
-              </a:spcBef>
-            </a:pPr>
-            <a:r>
-              <a:rPr lang="en-US" sz="2400" dirty="0">
-                <a:latin typeface="Century Gothic" panose="020B0502020202020204" pitchFamily="34" charset="0"/>
-              </a:rPr>
-              <a:t>We believe there might be some problems related to police staffing, making them </a:t>
-            </a:r>
-            <a:r>
-              <a:rPr lang="en-US" sz="2400" b="1" dirty="0">
-                <a:latin typeface="Century Gothic" panose="020B0502020202020204" pitchFamily="34" charset="0"/>
-              </a:rPr>
-              <a:t>less reactive </a:t>
-            </a:r>
-            <a:r>
-              <a:rPr lang="en-US" sz="2400" dirty="0">
-                <a:latin typeface="Century Gothic" panose="020B0502020202020204" pitchFamily="34" charset="0"/>
-              </a:rPr>
-              <a:t>to </a:t>
-            </a:r>
-            <a:r>
-              <a:rPr lang="en-US" sz="2400" b="1" dirty="0">
-                <a:latin typeface="Century Gothic" panose="020B0502020202020204" pitchFamily="34" charset="0"/>
-              </a:rPr>
-              <a:t>simultaneous crimes </a:t>
-            </a:r>
-            <a:r>
-              <a:rPr lang="en-US" sz="2400" dirty="0">
-                <a:latin typeface="Century Gothic" panose="020B0502020202020204" pitchFamily="34" charset="0"/>
-              </a:rPr>
-              <a:t>in the same location.</a:t>
-            </a:r>
-          </a:p>
-        </p:txBody>
-      </p:sp>
     </p:spTree>
     <p:extLst>
       <p:ext uri="{BB962C8B-B14F-4D97-AF65-F5344CB8AC3E}">
-        <p14:creationId xmlns:p14="http://schemas.microsoft.com/office/powerpoint/2010/main" val="4254130472"/>
+        <p14:creationId xmlns:p14="http://schemas.microsoft.com/office/powerpoint/2010/main" val="1308597565"/>
       </p:ext>
     </p:extLst>
   </p:cSld>
@@ -13350,38 +15136,143 @@
               <a:rPr lang="pt-PT" sz="4000" dirty="0">
                 <a:latin typeface="Century Gothic" panose="020B0502020202020204" pitchFamily="34" charset="0"/>
               </a:rPr>
-              <a:t>Things found on the internet</a:t>
+              <a:t>Placing hypothesis</a:t>
             </a:r>
           </a:p>
         </p:txBody>
       </p:sp>
-      <p:pic>
-        <p:nvPicPr>
-          <p:cNvPr id="16" name="Picture 15"/>
-          <p:cNvPicPr>
-            <a:picLocks noChangeAspect="1"/>
-          </p:cNvPicPr>
-          <p:nvPr/>
-        </p:nvPicPr>
-        <p:blipFill rotWithShape="1">
-          <a:blip r:embed="rId2"/>
-          <a:srcRect l="2292" t="16439" r="43913" b="15656"/>
-          <a:stretch/>
-        </p:blipFill>
+      <p:sp>
+        <p:nvSpPr>
+          <p:cNvPr id="3" name="Marcador de Posição de Conteúdo 2">
+            <a:extLst>
+              <a:ext uri="{FF2B5EF4-FFF2-40B4-BE49-F238E27FC236}">
+                <a16:creationId xmlns:a16="http://schemas.microsoft.com/office/drawing/2014/main" id="{DAC13582-5694-454F-816D-1164D422E1AA}"/>
+              </a:ext>
+            </a:extLst>
+          </p:cNvPr>
+          <p:cNvSpPr>
+            <a:spLocks noGrp="1"/>
+          </p:cNvSpPr>
+          <p:nvPr>
+            <p:ph idx="1"/>
+          </p:nvPr>
+        </p:nvSpPr>
         <p:spPr>
           <a:xfrm>
-            <a:off x="2305050" y="1691481"/>
-            <a:ext cx="6953250" cy="4445520"/>
+            <a:off x="838199" y="1879601"/>
+            <a:ext cx="8252791" cy="4351338"/>
           </a:xfrm>
-          <a:prstGeom prst="rect">
-            <a:avLst/>
-          </a:prstGeom>
         </p:spPr>
-      </p:pic>
+        <p:txBody>
+          <a:bodyPr>
+            <a:normAutofit/>
+          </a:bodyPr>
+          <a:lstStyle/>
+          <a:p>
+            <a:pPr>
+              <a:spcBef>
+                <a:spcPts val="4800"/>
+              </a:spcBef>
+            </a:pPr>
+            <a:r>
+              <a:rPr lang="en-US" sz="2400" dirty="0">
+                <a:latin typeface="Century Gothic" panose="020B0502020202020204" pitchFamily="34" charset="0"/>
+              </a:rPr>
+              <a:t>We believe crime has decreased in general terms, but there might be </a:t>
+            </a:r>
+            <a:r>
+              <a:rPr lang="en-US" sz="2400" b="1" dirty="0">
+                <a:latin typeface="Century Gothic" panose="020B0502020202020204" pitchFamily="34" charset="0"/>
+              </a:rPr>
+              <a:t>differences across segments</a:t>
+            </a:r>
+            <a:r>
+              <a:rPr lang="en-US" sz="2400" dirty="0">
+                <a:latin typeface="Century Gothic" panose="020B0502020202020204" pitchFamily="34" charset="0"/>
+              </a:rPr>
+              <a:t>. </a:t>
+            </a:r>
+          </a:p>
+          <a:p>
+            <a:pPr>
+              <a:spcBef>
+                <a:spcPts val="4800"/>
+              </a:spcBef>
+            </a:pPr>
+            <a:r>
+              <a:rPr lang="en-US" sz="2400" dirty="0">
+                <a:latin typeface="Century Gothic" panose="020B0502020202020204" pitchFamily="34" charset="0"/>
+              </a:rPr>
+              <a:t>We believe the police might </a:t>
+            </a:r>
+            <a:r>
+              <a:rPr lang="en-US" sz="2400" b="1" dirty="0">
+                <a:latin typeface="Century Gothic" panose="020B0502020202020204" pitchFamily="34" charset="0"/>
+              </a:rPr>
+              <a:t>not be addressing </a:t>
+            </a:r>
+            <a:r>
+              <a:rPr lang="en-US" sz="2400" dirty="0">
+                <a:latin typeface="Century Gothic" panose="020B0502020202020204" pitchFamily="34" charset="0"/>
+              </a:rPr>
+              <a:t>crime types in proportion to their </a:t>
+            </a:r>
+            <a:r>
+              <a:rPr lang="en-US" sz="2400" b="1" dirty="0">
+                <a:latin typeface="Century Gothic" panose="020B0502020202020204" pitchFamily="34" charset="0"/>
+              </a:rPr>
+              <a:t>volume/seriousness</a:t>
+            </a:r>
+            <a:r>
+              <a:rPr lang="en-US" sz="2400" dirty="0">
+                <a:latin typeface="Century Gothic" panose="020B0502020202020204" pitchFamily="34" charset="0"/>
+              </a:rPr>
+              <a:t>.</a:t>
+            </a:r>
+          </a:p>
+          <a:p>
+            <a:pPr>
+              <a:spcBef>
+                <a:spcPts val="4800"/>
+              </a:spcBef>
+            </a:pPr>
+            <a:r>
+              <a:rPr lang="en-US" sz="2400" dirty="0">
+                <a:latin typeface="Century Gothic" panose="020B0502020202020204" pitchFamily="34" charset="0"/>
+              </a:rPr>
+              <a:t>We believe there might be some problems related to police staffing, making them </a:t>
+            </a:r>
+            <a:r>
+              <a:rPr lang="en-US" sz="2400" b="1" dirty="0">
+                <a:latin typeface="Century Gothic" panose="020B0502020202020204" pitchFamily="34" charset="0"/>
+              </a:rPr>
+              <a:t>less reactive </a:t>
+            </a:r>
+            <a:r>
+              <a:rPr lang="en-US" sz="2400" dirty="0">
+                <a:latin typeface="Century Gothic" panose="020B0502020202020204" pitchFamily="34" charset="0"/>
+              </a:rPr>
+              <a:t>to </a:t>
+            </a:r>
+            <a:r>
+              <a:rPr lang="en-US" sz="2400" b="1" dirty="0">
+                <a:latin typeface="Century Gothic" panose="020B0502020202020204" pitchFamily="34" charset="0"/>
+              </a:rPr>
+              <a:t>simultaneous crimes </a:t>
+            </a:r>
+            <a:r>
+              <a:rPr lang="en-US" sz="2400" dirty="0">
+                <a:latin typeface="Century Gothic" panose="020B0502020202020204" pitchFamily="34" charset="0"/>
+              </a:rPr>
+              <a:t>in the same location.</a:t>
+            </a:r>
+          </a:p>
+        </p:txBody>
+      </p:sp>
     </p:spTree>
     <p:extLst>
       <p:ext uri="{BB962C8B-B14F-4D97-AF65-F5344CB8AC3E}">
-        <p14:creationId xmlns:p14="http://schemas.microsoft.com/office/powerpoint/2010/main" val="441325374"/>
+        <p14:creationId xmlns:p14="http://schemas.microsoft.com/office/powerpoint/2010/main" val="4254130472"/>
       </p:ext>
     </p:extLst>
   </p:cSld>
@@ -13440,6 +15331,96 @@
               <a:rPr lang="pt-PT" sz="4000" dirty="0">
                 <a:latin typeface="Century Gothic" panose="020B0502020202020204" pitchFamily="34" charset="0"/>
               </a:rPr>
+              <a:t>Things found on the internet</a:t>
+            </a:r>
+          </a:p>
+        </p:txBody>
+      </p:sp>
+      <p:pic>
+        <p:nvPicPr>
+          <p:cNvPr id="16" name="Picture 15"/>
+          <p:cNvPicPr>
+            <a:picLocks noChangeAspect="1"/>
+          </p:cNvPicPr>
+          <p:nvPr/>
+        </p:nvPicPr>
+        <p:blipFill rotWithShape="1">
+          <a:blip r:embed="rId2"/>
+          <a:srcRect l="2292" t="16439" r="43913" b="15656"/>
+          <a:stretch/>
+        </p:blipFill>
+        <p:spPr>
+          <a:xfrm>
+            <a:off x="2305050" y="1691481"/>
+            <a:ext cx="6953250" cy="4445520"/>
+          </a:xfrm>
+          <a:prstGeom prst="rect">
+            <a:avLst/>
+          </a:prstGeom>
+        </p:spPr>
+      </p:pic>
+    </p:spTree>
+    <p:extLst>
+      <p:ext uri="{BB962C8B-B14F-4D97-AF65-F5344CB8AC3E}">
+        <p14:creationId xmlns:p14="http://schemas.microsoft.com/office/powerpoint/2010/main" val="441325374"/>
+      </p:ext>
+    </p:extLst>
+  </p:cSld>
+  <p:clrMapOvr>
+    <a:masterClrMapping/>
+  </p:clrMapOvr>
+</p:sld>
+</file>
+
+<file path=ppt/slides/slide8.xml><?xml version="1.0" encoding="utf-8"?>
+<p:sld xmlns:a="http://schemas.openxmlformats.org/drawingml/2006/main" xmlns:r="http://schemas.openxmlformats.org/officeDocument/2006/relationships" xmlns:p="http://schemas.openxmlformats.org/presentationml/2006/main">
+  <p:cSld>
+    <p:spTree>
+      <p:nvGrpSpPr>
+        <p:cNvPr id="1" name=""/>
+        <p:cNvGrpSpPr/>
+        <p:nvPr/>
+      </p:nvGrpSpPr>
+      <p:grpSpPr>
+        <a:xfrm>
+          <a:off x="0" y="0"/>
+          <a:ext cx="0" cy="0"/>
+          <a:chOff x="0" y="0"/>
+          <a:chExt cx="0" cy="0"/>
+        </a:xfrm>
+      </p:grpSpPr>
+      <p:sp>
+        <p:nvSpPr>
+          <p:cNvPr id="2" name="Título 1">
+            <a:extLst>
+              <a:ext uri="{FF2B5EF4-FFF2-40B4-BE49-F238E27FC236}">
+                <a16:creationId xmlns:a16="http://schemas.microsoft.com/office/drawing/2014/main" id="{B444DAE9-063B-485F-915E-778F7D0E1CC1}"/>
+              </a:ext>
+            </a:extLst>
+          </p:cNvPr>
+          <p:cNvSpPr>
+            <a:spLocks noGrp="1"/>
+          </p:cNvSpPr>
+          <p:nvPr>
+            <p:ph type="title"/>
+          </p:nvPr>
+        </p:nvSpPr>
+        <p:spPr>
+          <a:xfrm>
+            <a:off x="838200" y="365918"/>
+            <a:ext cx="10515600" cy="1325563"/>
+          </a:xfrm>
+        </p:spPr>
+        <p:txBody>
+          <a:bodyPr>
+            <a:normAutofit/>
+          </a:bodyPr>
+          <a:lstStyle/>
+          <a:p>
+            <a:r>
+              <a:rPr lang="pt-PT" sz="4000" dirty="0">
+                <a:latin typeface="Century Gothic" panose="020B0502020202020204" pitchFamily="34" charset="0"/>
+              </a:rPr>
               <a:t>Challenges ahead</a:t>
             </a:r>
           </a:p>
@@ -13562,8 +15543,8 @@
           </a:p>
         </p:txBody>
       </p:sp>
-      <mc:AlternateContent xmlns:mc="http://schemas.openxmlformats.org/markup-compatibility/2006" xmlns:a14="http://schemas.microsoft.com/office/drawing/2010/main">
-        <mc:Choice Requires="a14">
+      <mc:AlternateContent xmlns:mc="http://schemas.openxmlformats.org/markup-compatibility/2006">
+        <mc:Choice xmlns:a14="http://schemas.microsoft.com/office/drawing/2010/main" Requires="a14">
           <p:sp>
             <p:nvSpPr>
               <p:cNvPr id="4" name="TextBox 3"/>
@@ -13572,7 +15553,7 @@
             </p:nvSpPr>
             <p:spPr>
               <a:xfrm>
-                <a:off x="7789817" y="2034381"/>
+                <a:off x="7789817" y="1357982"/>
                 <a:ext cx="2522677" cy="582339"/>
               </a:xfrm>
               <a:prstGeom prst="rect">
@@ -13769,7 +15750,7 @@
             </p:txBody>
           </p:sp>
         </mc:Choice>
-        <mc:Fallback xmlns="">
+        <mc:Fallback>
           <p:sp>
             <p:nvSpPr>
               <p:cNvPr id="4" name="TextBox 3"/>
@@ -13780,16 +15761,16 @@
             </p:nvSpPr>
             <p:spPr>
               <a:xfrm>
-                <a:off x="7789817" y="2034381"/>
+                <a:off x="7789817" y="1357982"/>
                 <a:ext cx="2522677" cy="582339"/>
               </a:xfrm>
               <a:prstGeom prst="rect">
                 <a:avLst/>
               </a:prstGeom>
               <a:blipFill>
-                <a:blip r:embed="rId2"/>
+                <a:blip r:embed="rId3"/>
                 <a:stretch>
-                  <a:fillRect/>
+                  <a:fillRect b="-1053"/>
                 </a:stretch>
               </a:blipFill>
             </p:spPr>
@@ -13798,7 +15779,7 @@
               <a:lstStyle/>
               <a:p>
                 <a:r>
-                  <a:rPr lang="sv-SE">
+                  <a:rPr lang="pt-PT">
                     <a:noFill/>
                   </a:rPr>
                   <a:t> </a:t>
@@ -13808,6 +15789,152 @@
           </p:sp>
         </mc:Fallback>
       </mc:AlternateContent>
+      <p:sp>
+        <p:nvSpPr>
+          <p:cNvPr id="5" name="CaixaDeTexto 4">
+            <a:extLst>
+              <a:ext uri="{FF2B5EF4-FFF2-40B4-BE49-F238E27FC236}">
+                <a16:creationId xmlns:a16="http://schemas.microsoft.com/office/drawing/2014/main" id="{B17F2837-961B-4AF5-A0DF-B728D367A562}"/>
+              </a:ext>
+            </a:extLst>
+          </p:cNvPr>
+          <p:cNvSpPr txBox="1"/>
+          <p:nvPr/>
+        </p:nvSpPr>
+        <p:spPr>
+          <a:xfrm>
+            <a:off x="8939663" y="2329890"/>
+            <a:ext cx="2745661" cy="461665"/>
+          </a:xfrm>
+          <a:prstGeom prst="rect">
+            <a:avLst/>
+          </a:prstGeom>
+          <a:noFill/>
+        </p:spPr>
+        <p:txBody>
+          <a:bodyPr wrap="square" rtlCol="0">
+            <a:spAutoFit/>
+          </a:bodyPr>
+          <a:lstStyle/>
+          <a:p>
+            <a:r>
+              <a:rPr lang="pt-PT" sz="1200" dirty="0">
+                <a:latin typeface="Century Gothic" panose="020B0502020202020204" pitchFamily="34" charset="0"/>
+              </a:rPr>
+              <a:t>ICCS – </a:t>
+            </a:r>
+            <a:r>
+              <a:rPr lang="pt-PT" sz="1200" dirty="0" err="1">
+                <a:latin typeface="Century Gothic" panose="020B0502020202020204" pitchFamily="34" charset="0"/>
+              </a:rPr>
+              <a:t>International</a:t>
+            </a:r>
+            <a:r>
+              <a:rPr lang="pt-PT" sz="1200" dirty="0">
+                <a:latin typeface="Century Gothic" panose="020B0502020202020204" pitchFamily="34" charset="0"/>
+              </a:rPr>
+              <a:t> </a:t>
+            </a:r>
+            <a:r>
+              <a:rPr lang="pt-PT" sz="1200" dirty="0" err="1">
+                <a:latin typeface="Century Gothic" panose="020B0502020202020204" pitchFamily="34" charset="0"/>
+              </a:rPr>
+              <a:t>Classification</a:t>
+            </a:r>
+            <a:r>
+              <a:rPr lang="pt-PT" sz="1200" dirty="0">
+                <a:latin typeface="Century Gothic" panose="020B0502020202020204" pitchFamily="34" charset="0"/>
+              </a:rPr>
+              <a:t> </a:t>
+            </a:r>
+            <a:r>
+              <a:rPr lang="pt-PT" sz="1200" dirty="0" err="1">
+                <a:latin typeface="Century Gothic" panose="020B0502020202020204" pitchFamily="34" charset="0"/>
+              </a:rPr>
+              <a:t>of</a:t>
+            </a:r>
+            <a:r>
+              <a:rPr lang="pt-PT" sz="1200" dirty="0">
+                <a:latin typeface="Century Gothic" panose="020B0502020202020204" pitchFamily="34" charset="0"/>
+              </a:rPr>
+              <a:t> Crime for </a:t>
+            </a:r>
+            <a:r>
+              <a:rPr lang="pt-PT" sz="1200" dirty="0" err="1">
+                <a:latin typeface="Century Gothic" panose="020B0502020202020204" pitchFamily="34" charset="0"/>
+              </a:rPr>
+              <a:t>Statistical</a:t>
+            </a:r>
+            <a:r>
+              <a:rPr lang="pt-PT" sz="1200" dirty="0">
+                <a:latin typeface="Century Gothic" panose="020B0502020202020204" pitchFamily="34" charset="0"/>
+              </a:rPr>
+              <a:t> </a:t>
+            </a:r>
+            <a:r>
+              <a:rPr lang="pt-PT" sz="1200" dirty="0" err="1">
+                <a:latin typeface="Century Gothic" panose="020B0502020202020204" pitchFamily="34" charset="0"/>
+              </a:rPr>
+              <a:t>purposes</a:t>
+            </a:r>
+            <a:endParaRPr lang="pt-PT" sz="1200" dirty="0">
+              <a:latin typeface="Century Gothic" panose="020B0502020202020204" pitchFamily="34" charset="0"/>
+            </a:endParaRPr>
+          </a:p>
+        </p:txBody>
+      </p:sp>
+      <p:sp>
+        <p:nvSpPr>
+          <p:cNvPr id="6" name="CaixaDeTexto 5">
+            <a:extLst>
+              <a:ext uri="{FF2B5EF4-FFF2-40B4-BE49-F238E27FC236}">
+                <a16:creationId xmlns:a16="http://schemas.microsoft.com/office/drawing/2014/main" id="{6C8C33C3-91E9-4CB4-987B-6A2AA593D526}"/>
+              </a:ext>
+            </a:extLst>
+          </p:cNvPr>
+          <p:cNvSpPr txBox="1"/>
+          <p:nvPr/>
+        </p:nvSpPr>
+        <p:spPr>
+          <a:xfrm>
+            <a:off x="8098655" y="3152001"/>
+            <a:ext cx="1905000" cy="276999"/>
+          </a:xfrm>
+          <a:prstGeom prst="rect">
+            <a:avLst/>
+          </a:prstGeom>
+          <a:noFill/>
+        </p:spPr>
+        <p:txBody>
+          <a:bodyPr wrap="square" rtlCol="0">
+            <a:spAutoFit/>
+          </a:bodyPr>
+          <a:lstStyle/>
+          <a:p>
+            <a:r>
+              <a:rPr lang="pt-PT" sz="1200" dirty="0" err="1">
+                <a:latin typeface="Century Gothic" panose="020B0502020202020204" pitchFamily="34" charset="0"/>
+              </a:rPr>
+              <a:t>Sellin</a:t>
+            </a:r>
+            <a:r>
+              <a:rPr lang="pt-PT" sz="1200" dirty="0">
+                <a:latin typeface="Century Gothic" panose="020B0502020202020204" pitchFamily="34" charset="0"/>
+              </a:rPr>
+              <a:t>-Wolfgang </a:t>
+            </a:r>
+            <a:r>
+              <a:rPr lang="pt-PT" sz="1200" dirty="0" err="1">
+                <a:latin typeface="Century Gothic" panose="020B0502020202020204" pitchFamily="34" charset="0"/>
+              </a:rPr>
+              <a:t>Scale</a:t>
+            </a:r>
+            <a:endParaRPr lang="pt-PT" sz="1200" dirty="0">
+              <a:latin typeface="Century Gothic" panose="020B0502020202020204" pitchFamily="34" charset="0"/>
+            </a:endParaRPr>
+          </a:p>
+        </p:txBody>
+      </p:sp>
     </p:spTree>
     <p:extLst>
       <p:ext uri="{BB962C8B-B14F-4D97-AF65-F5344CB8AC3E}">
@@ -13821,7 +15948,7 @@
 </p:sld>
 </file>
 
-<file path=ppt/slides/slide8.xml><?xml version="1.0" encoding="utf-8"?>
+<file path=ppt/slides/slide9.xml><?xml version="1.0" encoding="utf-8"?>
 <p:sld xmlns:a="http://schemas.openxmlformats.org/drawingml/2006/main" xmlns:r="http://schemas.openxmlformats.org/officeDocument/2006/relationships" xmlns:p="http://schemas.openxmlformats.org/presentationml/2006/main">
   <p:cSld>
     <p:spTree>
@@ -14171,4 +16298,299 @@
     </a:ext>
   </a:extLst>
 </a:theme>
+</file>
+
+<file path=ppt/theme/theme2.xml><?xml version="1.0" encoding="utf-8"?>
+<a:theme xmlns:a="http://schemas.openxmlformats.org/drawingml/2006/main" name="Tema do Office">
+  <a:themeElements>
+    <a:clrScheme name="Office">
+      <a:dk1>
+        <a:sysClr val="windowText" lastClr="000000"/>
+      </a:dk1>
+      <a:lt1>
+        <a:sysClr val="window" lastClr="FFFFFF"/>
+      </a:lt1>
+      <a:dk2>
+        <a:srgbClr val="44546A"/>
+      </a:dk2>
+      <a:lt2>
+        <a:srgbClr val="E7E6E6"/>
+      </a:lt2>
+      <a:accent1>
+        <a:srgbClr val="4472C4"/>
+      </a:accent1>
+      <a:accent2>
+        <a:srgbClr val="ED7D31"/>
+      </a:accent2>
+      <a:accent3>
+        <a:srgbClr val="A5A5A5"/>
+      </a:accent3>
+      <a:accent4>
+        <a:srgbClr val="FFC000"/>
+      </a:accent4>
+      <a:accent5>
+        <a:srgbClr val="5B9BD5"/>
+      </a:accent5>
+      <a:accent6>
+        <a:srgbClr val="70AD47"/>
+      </a:accent6>
+      <a:hlink>
+        <a:srgbClr val="0563C1"/>
+      </a:hlink>
+      <a:folHlink>
+        <a:srgbClr val="954F72"/>
+      </a:folHlink>
+    </a:clrScheme>
+    <a:fontScheme name="Office">
+      <a:majorFont>
+        <a:latin typeface="Calibri Light" panose="020F0302020204030204"/>
+        <a:ea typeface=""/>
+        <a:cs typeface=""/>
+        <a:font script="Jpan" typeface="游ゴシック Light"/>
+        <a:font script="Hang" typeface="맑은 고딕"/>
+        <a:font script="Hans" typeface="等线 Light"/>
+        <a:font script="Hant" typeface="新細明體"/>
+        <a:font script="Arab" typeface="Times New Roman"/>
+        <a:font script="Hebr" typeface="Times New Roman"/>
+        <a:font script="Thai" typeface="Angsana New"/>
+        <a:font script="Ethi" typeface="Nyala"/>
+        <a:font script="Beng" typeface="Vrinda"/>
+        <a:font script="Gujr" typeface="Shruti"/>
+        <a:font script="Khmr" typeface="MoolBoran"/>
+        <a:font script="Knda" typeface="Tunga"/>
+        <a:font script="Guru" typeface="Raavi"/>
+        <a:font script="Cans" typeface="Euphemia"/>
+        <a:font script="Cher" typeface="Plantagenet Cherokee"/>
+        <a:font script="Yiii" typeface="Microsoft Yi Baiti"/>
+        <a:font script="Tibt" typeface="Microsoft Himalaya"/>
+        <a:font script="Thaa" typeface="MV Boli"/>
+        <a:font script="Deva" typeface="Mangal"/>
+        <a:font script="Telu" typeface="Gautami"/>
+        <a:font script="Taml" typeface="Latha"/>
+        <a:font script="Syrc" typeface="Estrangelo Edessa"/>
+        <a:font script="Orya" typeface="Kalinga"/>
+        <a:font script="Mlym" typeface="Kartika"/>
+        <a:font script="Laoo" typeface="DokChampa"/>
+        <a:font script="Sinh" typeface="Iskoola Pota"/>
+        <a:font script="Mong" typeface="Mongolian Baiti"/>
+        <a:font script="Viet" typeface="Times New Roman"/>
+        <a:font script="Uigh" typeface="Microsoft Uighur"/>
+        <a:font script="Geor" typeface="Sylfaen"/>
+        <a:font script="Armn" typeface="Arial"/>
+        <a:font script="Bugi" typeface="Leelawadee UI"/>
+        <a:font script="Bopo" typeface="Microsoft JhengHei"/>
+        <a:font script="Java" typeface="Javanese Text"/>
+        <a:font script="Lisu" typeface="Segoe UI"/>
+        <a:font script="Mymr" typeface="Myanmar Text"/>
+        <a:font script="Nkoo" typeface="Ebrima"/>
+        <a:font script="Olck" typeface="Nirmala UI"/>
+        <a:font script="Osma" typeface="Ebrima"/>
+        <a:font script="Phag" typeface="Phagspa"/>
+        <a:font script="Syrn" typeface="Estrangelo Edessa"/>
+        <a:font script="Syrj" typeface="Estrangelo Edessa"/>
+        <a:font script="Syre" typeface="Estrangelo Edessa"/>
+        <a:font script="Sora" typeface="Nirmala UI"/>
+        <a:font script="Tale" typeface="Microsoft Tai Le"/>
+        <a:font script="Talu" typeface="Microsoft New Tai Lue"/>
+        <a:font script="Tfng" typeface="Ebrima"/>
+      </a:majorFont>
+      <a:minorFont>
+        <a:latin typeface="Calibri" panose="020F0502020204030204"/>
+        <a:ea typeface=""/>
+        <a:cs typeface=""/>
+        <a:font script="Jpan" typeface="游ゴシック"/>
+        <a:font script="Hang" typeface="맑은 고딕"/>
+        <a:font script="Hans" typeface="等线"/>
+        <a:font script="Hant" typeface="新細明體"/>
+        <a:font script="Arab" typeface="Arial"/>
+        <a:font script="Hebr" typeface="Arial"/>
+        <a:font script="Thai" typeface="Cordia New"/>
+        <a:font script="Ethi" typeface="Nyala"/>
+        <a:font script="Beng" typeface="Vrinda"/>
+        <a:font script="Gujr" typeface="Shruti"/>
+        <a:font script="Khmr" typeface="DaunPenh"/>
+        <a:font script="Knda" typeface="Tunga"/>
+        <a:font script="Guru" typeface="Raavi"/>
+        <a:font script="Cans" typeface="Euphemia"/>
+        <a:font script="Cher" typeface="Plantagenet Cherokee"/>
+        <a:font script="Yiii" typeface="Microsoft Yi Baiti"/>
+        <a:font script="Tibt" typeface="Microsoft Himalaya"/>
+        <a:font script="Thaa" typeface="MV Boli"/>
+        <a:font script="Deva" typeface="Mangal"/>
+        <a:font script="Telu" typeface="Gautami"/>
+        <a:font script="Taml" typeface="Latha"/>
+        <a:font script="Syrc" typeface="Estrangelo Edessa"/>
+        <a:font script="Orya" typeface="Kalinga"/>
+        <a:font script="Mlym" typeface="Kartika"/>
+        <a:font script="Laoo" typeface="DokChampa"/>
+        <a:font script="Sinh" typeface="Iskoola Pota"/>
+        <a:font script="Mong" typeface="Mongolian Baiti"/>
+        <a:font script="Viet" typeface="Arial"/>
+        <a:font script="Uigh" typeface="Microsoft Uighur"/>
+        <a:font script="Geor" typeface="Sylfaen"/>
+        <a:font script="Armn" typeface="Arial"/>
+        <a:font script="Bugi" typeface="Leelawadee UI"/>
+        <a:font script="Bopo" typeface="Microsoft JhengHei"/>
+        <a:font script="Java" typeface="Javanese Text"/>
+        <a:font script="Lisu" typeface="Segoe UI"/>
+        <a:font script="Mymr" typeface="Myanmar Text"/>
+        <a:font script="Nkoo" typeface="Ebrima"/>
+        <a:font script="Olck" typeface="Nirmala UI"/>
+        <a:font script="Osma" typeface="Ebrima"/>
+        <a:font script="Phag" typeface="Phagspa"/>
+        <a:font script="Syrn" typeface="Estrangelo Edessa"/>
+        <a:font script="Syrj" typeface="Estrangelo Edessa"/>
+        <a:font script="Syre" typeface="Estrangelo Edessa"/>
+        <a:font script="Sora" typeface="Nirmala UI"/>
+        <a:font script="Tale" typeface="Microsoft Tai Le"/>
+        <a:font script="Talu" typeface="Microsoft New Tai Lue"/>
+        <a:font script="Tfng" typeface="Ebrima"/>
+      </a:minorFont>
+    </a:fontScheme>
+    <a:fmtScheme name="Office">
+      <a:fillStyleLst>
+        <a:solidFill>
+          <a:schemeClr val="phClr"/>
+        </a:solidFill>
+        <a:gradFill rotWithShape="1">
+          <a:gsLst>
+            <a:gs pos="0">
+              <a:schemeClr val="phClr">
+                <a:lumMod val="110000"/>
+                <a:satMod val="105000"/>
+                <a:tint val="67000"/>
+              </a:schemeClr>
+            </a:gs>
+            <a:gs pos="50000">
+              <a:schemeClr val="phClr">
+                <a:lumMod val="105000"/>
+                <a:satMod val="103000"/>
+                <a:tint val="73000"/>
+              </a:schemeClr>
+            </a:gs>
+            <a:gs pos="100000">
+              <a:schemeClr val="phClr">
+                <a:lumMod val="105000"/>
+                <a:satMod val="109000"/>
+                <a:tint val="81000"/>
+              </a:schemeClr>
+            </a:gs>
+          </a:gsLst>
+          <a:lin ang="5400000" scaled="0"/>
+        </a:gradFill>
+        <a:gradFill rotWithShape="1">
+          <a:gsLst>
+            <a:gs pos="0">
+              <a:schemeClr val="phClr">
+                <a:satMod val="103000"/>
+                <a:lumMod val="102000"/>
+                <a:tint val="94000"/>
+              </a:schemeClr>
+            </a:gs>
+            <a:gs pos="50000">
+              <a:schemeClr val="phClr">
+                <a:satMod val="110000"/>
+                <a:lumMod val="100000"/>
+                <a:shade val="100000"/>
+              </a:schemeClr>
+            </a:gs>
+            <a:gs pos="100000">
+              <a:schemeClr val="phClr">
+                <a:lumMod val="99000"/>
+                <a:satMod val="120000"/>
+                <a:shade val="78000"/>
+              </a:schemeClr>
+            </a:gs>
+          </a:gsLst>
+          <a:lin ang="5400000" scaled="0"/>
+        </a:gradFill>
+      </a:fillStyleLst>
+      <a:lnStyleLst>
+        <a:ln w="6350" cap="flat" cmpd="sng" algn="ctr">
+          <a:solidFill>
+            <a:schemeClr val="phClr"/>
+          </a:solidFill>
+          <a:prstDash val="solid"/>
+          <a:miter lim="800000"/>
+        </a:ln>
+        <a:ln w="12700" cap="flat" cmpd="sng" algn="ctr">
+          <a:solidFill>
+            <a:schemeClr val="phClr"/>
+          </a:solidFill>
+          <a:prstDash val="solid"/>
+          <a:miter lim="800000"/>
+        </a:ln>
+        <a:ln w="19050" cap="flat" cmpd="sng" algn="ctr">
+          <a:solidFill>
+            <a:schemeClr val="phClr"/>
+          </a:solidFill>
+          <a:prstDash val="solid"/>
+          <a:miter lim="800000"/>
+        </a:ln>
+      </a:lnStyleLst>
+      <a:effectStyleLst>
+        <a:effectStyle>
+          <a:effectLst/>
+        </a:effectStyle>
+        <a:effectStyle>
+          <a:effectLst/>
+        </a:effectStyle>
+        <a:effectStyle>
+          <a:effectLst>
+            <a:outerShdw blurRad="57150" dist="19050" dir="5400000" algn="ctr" rotWithShape="0">
+              <a:srgbClr val="000000">
+                <a:alpha val="63000"/>
+              </a:srgbClr>
+            </a:outerShdw>
+          </a:effectLst>
+        </a:effectStyle>
+      </a:effectStyleLst>
+      <a:bgFillStyleLst>
+        <a:solidFill>
+          <a:schemeClr val="phClr"/>
+        </a:solidFill>
+        <a:solidFill>
+          <a:schemeClr val="phClr">
+            <a:tint val="95000"/>
+            <a:satMod val="170000"/>
+          </a:schemeClr>
+        </a:solidFill>
+        <a:gradFill rotWithShape="1">
+          <a:gsLst>
+            <a:gs pos="0">
+              <a:schemeClr val="phClr">
+                <a:tint val="93000"/>
+                <a:satMod val="150000"/>
+                <a:shade val="98000"/>
+                <a:lumMod val="102000"/>
+              </a:schemeClr>
+            </a:gs>
+            <a:gs pos="50000">
+              <a:schemeClr val="phClr">
+                <a:tint val="98000"/>
+                <a:satMod val="130000"/>
+                <a:shade val="90000"/>
+                <a:lumMod val="103000"/>
+              </a:schemeClr>
+            </a:gs>
+            <a:gs pos="100000">
+              <a:schemeClr val="phClr">
+                <a:shade val="63000"/>
+                <a:satMod val="120000"/>
+              </a:schemeClr>
+            </a:gs>
+          </a:gsLst>
+          <a:lin ang="5400000" scaled="0"/>
+        </a:gradFill>
+      </a:bgFillStyleLst>
+    </a:fmtScheme>
+  </a:themeElements>
+  <a:objectDefaults/>
+  <a:extraClrSchemeLst/>
+  <a:extLst>
+    <a:ext uri="{05A4C25C-085E-4340-85A3-A5531E510DB2}">
+      <thm15:themeFamily xmlns:thm15="http://schemas.microsoft.com/office/thememl/2012/main" name="Office Theme" id="{62F939B6-93AF-4DB8-9C6B-D6C7DFDC589F}" vid="{4A3C46E8-61CC-4603-A589-7422A47A8E4A}"/>
+    </a:ext>
+  </a:extLst>
+</a:theme>
 </file>
</xml_diff>